<commit_message>
update and add keynote template
</commit_message>
<xml_diff>
--- a/templates/GOSIM_China_2024_PPT-Template.pptx
+++ b/templates/GOSIM_China_2024_PPT-Template.pptx
@@ -6,18 +6,19 @@
   </p:sldMasterIdLst>
   <p:sldIdLst>
     <p:sldId id="262" r:id="rId2"/>
-    <p:sldId id="266" r:id="rId3"/>
-    <p:sldId id="265" r:id="rId4"/>
-    <p:sldId id="263" r:id="rId5"/>
-    <p:sldId id="268" r:id="rId6"/>
-    <p:sldId id="269" r:id="rId7"/>
-    <p:sldId id="270" r:id="rId8"/>
-    <p:sldId id="264" r:id="rId9"/>
+    <p:sldId id="265" r:id="rId3"/>
+    <p:sldId id="272" r:id="rId4"/>
+    <p:sldId id="266" r:id="rId5"/>
+    <p:sldId id="263" r:id="rId6"/>
+    <p:sldId id="268" r:id="rId7"/>
+    <p:sldId id="269" r:id="rId8"/>
+    <p:sldId id="270" r:id="rId9"/>
+    <p:sldId id="264" r:id="rId10"/>
   </p:sldIdLst>
   <p:sldSz cx="12192000" cy="6858000"/>
   <p:notesSz cx="6858000" cy="9144000"/>
   <p:custDataLst>
-    <p:tags r:id="rId10"/>
+    <p:tags r:id="rId11"/>
   </p:custDataLst>
   <p:defaultTextStyle>
     <a:defPPr>
@@ -155,7 +156,7 @@
       </p:grpSpPr>
       <p:pic>
         <p:nvPicPr>
-          <p:cNvPr id="4" name="图片 3" descr="封面-无文字">
+          <p:cNvPr id="4" name="图片 3">
             <a:extLst>
               <a:ext uri="{FF2B5EF4-FFF2-40B4-BE49-F238E27FC236}">
                 <a16:creationId xmlns:a16="http://schemas.microsoft.com/office/drawing/2014/main" id="{2D5DEA44-99F5-844D-B733-EDAE2309A6AF}"/>
@@ -168,10 +169,15 @@
           <p:nvPr userDrawn="1"/>
         </p:nvPicPr>
         <p:blipFill>
-          <a:blip r:embed="rId4"/>
-          <a:stretch>
-            <a:fillRect/>
-          </a:stretch>
+          <a:blip r:embed="rId4">
+            <a:extLst>
+              <a:ext uri="{28A0092B-C50C-407E-A947-70E740481C1C}">
+                <a14:useLocalDpi xmlns:a14="http://schemas.microsoft.com/office/drawing/2010/main" val="0"/>
+              </a:ext>
+            </a:extLst>
+          </a:blip>
+          <a:srcRect/>
+          <a:stretch/>
         </p:blipFill>
         <p:spPr>
           <a:xfrm>
@@ -357,6 +363,41 @@
           </a:prstGeom>
         </p:spPr>
       </p:pic>
+      <p:pic>
+        <p:nvPicPr>
+          <p:cNvPr id="9" name="图片 8">
+            <a:extLst>
+              <a:ext uri="{FF2B5EF4-FFF2-40B4-BE49-F238E27FC236}">
+                <a16:creationId xmlns:a16="http://schemas.microsoft.com/office/drawing/2014/main" id="{392FD923-66E8-E3E3-E894-1BA48D45ECAA}"/>
+              </a:ext>
+            </a:extLst>
+          </p:cNvPr>
+          <p:cNvPicPr>
+            <a:picLocks noChangeAspect="1"/>
+          </p:cNvPicPr>
+          <p:nvPr userDrawn="1"/>
+        </p:nvPicPr>
+        <p:blipFill>
+          <a:blip r:embed="rId7" cstate="print">
+            <a:extLst>
+              <a:ext uri="{28A0092B-C50C-407E-A947-70E740481C1C}">
+                <a14:useLocalDpi xmlns:a14="http://schemas.microsoft.com/office/drawing/2010/main" val="0"/>
+              </a:ext>
+            </a:extLst>
+          </a:blip>
+          <a:srcRect/>
+          <a:stretch/>
+        </p:blipFill>
+        <p:spPr>
+          <a:xfrm>
+            <a:off x="9357737" y="499930"/>
+            <a:ext cx="2315468" cy="275024"/>
+          </a:xfrm>
+          <a:prstGeom prst="rect">
+            <a:avLst/>
+          </a:prstGeom>
+        </p:spPr>
+      </p:pic>
     </p:spTree>
   </p:cSld>
   <p:clrMapOvr>
@@ -366,804 +407,6 @@
 </file>
 
 <file path=ppt/slideLayouts/slideLayout10.xml><?xml version="1.0" encoding="utf-8"?>
-<p:sldLayout xmlns:a="http://schemas.openxmlformats.org/drawingml/2006/main" xmlns:r="http://schemas.openxmlformats.org/officeDocument/2006/relationships" xmlns:p="http://schemas.openxmlformats.org/presentationml/2006/main" preserve="1" userDrawn="1">
-  <p:cSld name="1_图片与标题">
-    <p:spTree>
-      <p:nvGrpSpPr>
-        <p:cNvPr id="1" name=""/>
-        <p:cNvGrpSpPr/>
-        <p:nvPr/>
-      </p:nvGrpSpPr>
-      <p:grpSpPr>
-        <a:xfrm>
-          <a:off x="0" y="0"/>
-          <a:ext cx="0" cy="0"/>
-          <a:chOff x="0" y="0"/>
-          <a:chExt cx="0" cy="0"/>
-        </a:xfrm>
-      </p:grpSpPr>
-      <p:pic>
-        <p:nvPicPr>
-          <p:cNvPr id="6" name="图片 5" descr="内页">
-            <a:extLst>
-              <a:ext uri="{FF2B5EF4-FFF2-40B4-BE49-F238E27FC236}">
-                <a16:creationId xmlns:a16="http://schemas.microsoft.com/office/drawing/2014/main" id="{F4CFDD88-9400-69BE-CAD1-052DACEE71A9}"/>
-              </a:ext>
-            </a:extLst>
-          </p:cNvPr>
-          <p:cNvPicPr>
-            <a:picLocks noChangeAspect="1"/>
-          </p:cNvPicPr>
-          <p:nvPr userDrawn="1"/>
-        </p:nvPicPr>
-        <p:blipFill>
-          <a:blip r:embed="rId4">
-            <a:alphaModFix amt="70000"/>
-          </a:blip>
-          <a:srcRect/>
-          <a:stretch/>
-        </p:blipFill>
-        <p:spPr>
-          <a:xfrm>
-            <a:off x="0" y="0"/>
-            <a:ext cx="12192000" cy="6858000"/>
-          </a:xfrm>
-          <a:prstGeom prst="rect">
-            <a:avLst/>
-          </a:prstGeom>
-        </p:spPr>
-      </p:pic>
-      <p:sp>
-        <p:nvSpPr>
-          <p:cNvPr id="3" name="图片占位符 2"/>
-          <p:cNvSpPr>
-            <a:spLocks noGrp="1"/>
-          </p:cNvSpPr>
-          <p:nvPr>
-            <p:ph type="pic" idx="1"/>
-            <p:custDataLst>
-              <p:tags r:id="rId1"/>
-            </p:custDataLst>
-          </p:nvPr>
-        </p:nvSpPr>
-        <p:spPr>
-          <a:xfrm>
-            <a:off x="608400" y="1338030"/>
-            <a:ext cx="5233077" cy="4324392"/>
-          </a:xfrm>
-        </p:spPr>
-        <p:txBody>
-          <a:bodyPr vert="horz" lIns="90000" tIns="46800" rIns="90000" bIns="46800" rtlCol="0">
-            <a:normAutofit/>
-          </a:bodyPr>
-          <a:lstStyle>
-            <a:lvl1pPr>
-              <a:buNone/>
-              <a:defRPr sz="1600"/>
-            </a:lvl1pPr>
-          </a:lstStyle>
-          <a:p>
-            <a:pPr lvl="0"/>
-            <a:endParaRPr lang="zh-CN" altLang="en-US"/>
-          </a:p>
-        </p:txBody>
-      </p:sp>
-      <p:sp>
-        <p:nvSpPr>
-          <p:cNvPr id="4" name="文本占位符 3"/>
-          <p:cNvSpPr>
-            <a:spLocks noGrp="1"/>
-          </p:cNvSpPr>
-          <p:nvPr>
-            <p:ph type="body" sz="half" idx="2"/>
-            <p:custDataLst>
-              <p:tags r:id="rId2"/>
-            </p:custDataLst>
-          </p:nvPr>
-        </p:nvSpPr>
-        <p:spPr>
-          <a:xfrm>
-            <a:off x="6350400" y="1338030"/>
-            <a:ext cx="5227200" cy="4324392"/>
-          </a:xfrm>
-        </p:spPr>
-        <p:txBody>
-          <a:bodyPr vert="horz" lIns="90000" tIns="46800" rIns="90000" bIns="46800" rtlCol="0">
-            <a:normAutofit/>
-          </a:bodyPr>
-          <a:lstStyle>
-            <a:lvl1pPr>
-              <a:buNone/>
-              <a:defRPr sz="1600"/>
-            </a:lvl1pPr>
-          </a:lstStyle>
-          <a:p>
-            <a:pPr lvl="0"/>
-            <a:r>
-              <a:rPr lang="zh-CN" altLang="en-US"/>
-              <a:t>单击此处编辑母版文本样式</a:t>
-            </a:r>
-          </a:p>
-        </p:txBody>
-      </p:sp>
-      <p:pic>
-        <p:nvPicPr>
-          <p:cNvPr id="7" name="图片 6" descr="logo">
-            <a:extLst>
-              <a:ext uri="{FF2B5EF4-FFF2-40B4-BE49-F238E27FC236}">
-                <a16:creationId xmlns:a16="http://schemas.microsoft.com/office/drawing/2014/main" id="{BE448B85-99E5-BB52-36B3-A57B3A91BE43}"/>
-              </a:ext>
-            </a:extLst>
-          </p:cNvPr>
-          <p:cNvPicPr>
-            <a:picLocks noChangeAspect="1"/>
-          </p:cNvPicPr>
-          <p:nvPr userDrawn="1"/>
-        </p:nvPicPr>
-        <p:blipFill>
-          <a:blip r:embed="rId5"/>
-          <a:stretch>
-            <a:fillRect/>
-          </a:stretch>
-        </p:blipFill>
-        <p:spPr>
-          <a:xfrm>
-            <a:off x="10333495" y="422275"/>
-            <a:ext cx="1551305" cy="474345"/>
-          </a:xfrm>
-          <a:prstGeom prst="rect">
-            <a:avLst/>
-          </a:prstGeom>
-        </p:spPr>
-      </p:pic>
-      <p:sp>
-        <p:nvSpPr>
-          <p:cNvPr id="8" name="标题 1">
-            <a:extLst>
-              <a:ext uri="{FF2B5EF4-FFF2-40B4-BE49-F238E27FC236}">
-                <a16:creationId xmlns:a16="http://schemas.microsoft.com/office/drawing/2014/main" id="{0A531B37-8C55-7A4C-BAB1-E5F033E0249E}"/>
-              </a:ext>
-            </a:extLst>
-          </p:cNvPr>
-          <p:cNvSpPr>
-            <a:spLocks noGrp="1"/>
-          </p:cNvSpPr>
-          <p:nvPr>
-            <p:ph type="title"/>
-          </p:nvPr>
-        </p:nvSpPr>
-        <p:spPr>
-          <a:xfrm>
-            <a:off x="608400" y="288360"/>
-            <a:ext cx="10969200" cy="705600"/>
-          </a:xfrm>
-        </p:spPr>
-        <p:txBody>
-          <a:bodyPr/>
-          <a:lstStyle/>
-          <a:p>
-            <a:endParaRPr lang="zh-CN" altLang="en-US" dirty="0"/>
-          </a:p>
-        </p:txBody>
-      </p:sp>
-    </p:spTree>
-    <p:extLst>
-      <p:ext uri="{BB962C8B-B14F-4D97-AF65-F5344CB8AC3E}">
-        <p14:creationId xmlns:p14="http://schemas.microsoft.com/office/powerpoint/2010/main" val="1890353880"/>
-      </p:ext>
-    </p:extLst>
-  </p:cSld>
-  <p:clrMapOvr>
-    <a:masterClrMapping/>
-  </p:clrMapOvr>
-</p:sldLayout>
-</file>
-
-<file path=ppt/slideLayouts/slideLayout11.xml><?xml version="1.0" encoding="utf-8"?>
-<p:sldLayout xmlns:a="http://schemas.openxmlformats.org/drawingml/2006/main" xmlns:r="http://schemas.openxmlformats.org/officeDocument/2006/relationships" xmlns:p="http://schemas.openxmlformats.org/presentationml/2006/main" preserve="1" userDrawn="1">
-  <p:cSld name="图片与标题">
-    <p:spTree>
-      <p:nvGrpSpPr>
-        <p:cNvPr id="1" name=""/>
-        <p:cNvGrpSpPr/>
-        <p:nvPr/>
-      </p:nvGrpSpPr>
-      <p:grpSpPr>
-        <a:xfrm>
-          <a:off x="0" y="0"/>
-          <a:ext cx="0" cy="0"/>
-          <a:chOff x="0" y="0"/>
-          <a:chExt cx="0" cy="0"/>
-        </a:xfrm>
-      </p:grpSpPr>
-      <p:pic>
-        <p:nvPicPr>
-          <p:cNvPr id="2" name="图片 1" descr="内页2">
-            <a:extLst>
-              <a:ext uri="{FF2B5EF4-FFF2-40B4-BE49-F238E27FC236}">
-                <a16:creationId xmlns:a16="http://schemas.microsoft.com/office/drawing/2014/main" id="{D171AAE7-2429-FABF-D894-F7A1A90715B5}"/>
-              </a:ext>
-            </a:extLst>
-          </p:cNvPr>
-          <p:cNvPicPr>
-            <a:picLocks noChangeAspect="1"/>
-          </p:cNvPicPr>
-          <p:nvPr userDrawn="1"/>
-        </p:nvPicPr>
-        <p:blipFill>
-          <a:blip r:embed="rId5">
-            <a:alphaModFix amt="35000"/>
-          </a:blip>
-          <a:stretch>
-            <a:fillRect/>
-          </a:stretch>
-        </p:blipFill>
-        <p:spPr>
-          <a:xfrm>
-            <a:off x="0" y="0"/>
-            <a:ext cx="12192000" cy="6858000"/>
-          </a:xfrm>
-          <a:prstGeom prst="rect">
-            <a:avLst/>
-          </a:prstGeom>
-        </p:spPr>
-      </p:pic>
-      <p:sp>
-        <p:nvSpPr>
-          <p:cNvPr id="3" name="图片占位符 2"/>
-          <p:cNvSpPr>
-            <a:spLocks noGrp="1"/>
-          </p:cNvSpPr>
-          <p:nvPr>
-            <p:ph type="pic" idx="1"/>
-            <p:custDataLst>
-              <p:tags r:id="rId1"/>
-            </p:custDataLst>
-          </p:nvPr>
-        </p:nvSpPr>
-        <p:spPr>
-          <a:xfrm>
-            <a:off x="608400" y="1555200"/>
-            <a:ext cx="5233077" cy="4608000"/>
-          </a:xfrm>
-        </p:spPr>
-        <p:txBody>
-          <a:bodyPr vert="horz" lIns="90000" tIns="46800" rIns="90000" bIns="46800" rtlCol="0">
-            <a:normAutofit/>
-          </a:bodyPr>
-          <a:lstStyle>
-            <a:lvl1pPr>
-              <a:buNone/>
-              <a:defRPr sz="1600"/>
-            </a:lvl1pPr>
-          </a:lstStyle>
-          <a:p>
-            <a:pPr lvl="0"/>
-            <a:endParaRPr lang="zh-CN" altLang="en-US"/>
-          </a:p>
-        </p:txBody>
-      </p:sp>
-      <p:sp>
-        <p:nvSpPr>
-          <p:cNvPr id="4" name="文本占位符 3"/>
-          <p:cNvSpPr>
-            <a:spLocks noGrp="1"/>
-          </p:cNvSpPr>
-          <p:nvPr>
-            <p:ph type="body" sz="half" idx="2"/>
-            <p:custDataLst>
-              <p:tags r:id="rId2"/>
-            </p:custDataLst>
-          </p:nvPr>
-        </p:nvSpPr>
-        <p:spPr>
-          <a:xfrm>
-            <a:off x="6350400" y="1555200"/>
-            <a:ext cx="5227200" cy="4608000"/>
-          </a:xfrm>
-        </p:spPr>
-        <p:txBody>
-          <a:bodyPr vert="horz" lIns="90000" tIns="46800" rIns="90000" bIns="46800" rtlCol="0">
-            <a:normAutofit/>
-          </a:bodyPr>
-          <a:lstStyle>
-            <a:lvl1pPr>
-              <a:buNone/>
-              <a:defRPr sz="1600"/>
-            </a:lvl1pPr>
-          </a:lstStyle>
-          <a:p>
-            <a:pPr lvl="0"/>
-            <a:r>
-              <a:rPr lang="zh-CN" altLang="en-US"/>
-              <a:t>单击此处编辑母版文本样式</a:t>
-            </a:r>
-          </a:p>
-        </p:txBody>
-      </p:sp>
-      <p:sp>
-        <p:nvSpPr>
-          <p:cNvPr id="9" name="标题 8"/>
-          <p:cNvSpPr>
-            <a:spLocks noGrp="1"/>
-          </p:cNvSpPr>
-          <p:nvPr>
-            <p:ph type="title"/>
-            <p:custDataLst>
-              <p:tags r:id="rId3"/>
-            </p:custDataLst>
-          </p:nvPr>
-        </p:nvSpPr>
-        <p:spPr/>
-        <p:txBody>
-          <a:bodyPr/>
-          <a:lstStyle/>
-          <a:p>
-            <a:r>
-              <a:rPr lang="zh-CN" altLang="en-US"/>
-              <a:t>单击此处编辑母版标题样式</a:t>
-            </a:r>
-          </a:p>
-        </p:txBody>
-      </p:sp>
-      <p:pic>
-        <p:nvPicPr>
-          <p:cNvPr id="8" name="图片 7" descr="logo">
-            <a:extLst>
-              <a:ext uri="{FF2B5EF4-FFF2-40B4-BE49-F238E27FC236}">
-                <a16:creationId xmlns:a16="http://schemas.microsoft.com/office/drawing/2014/main" id="{C1719E48-9330-25FB-022B-DD2E42C1740B}"/>
-              </a:ext>
-            </a:extLst>
-          </p:cNvPr>
-          <p:cNvPicPr>
-            <a:picLocks noChangeAspect="1"/>
-          </p:cNvPicPr>
-          <p:nvPr userDrawn="1"/>
-        </p:nvPicPr>
-        <p:blipFill>
-          <a:blip r:embed="rId6"/>
-          <a:stretch>
-            <a:fillRect/>
-          </a:stretch>
-        </p:blipFill>
-        <p:spPr>
-          <a:xfrm>
-            <a:off x="10333495" y="422275"/>
-            <a:ext cx="1551305" cy="474345"/>
-          </a:xfrm>
-          <a:prstGeom prst="rect">
-            <a:avLst/>
-          </a:prstGeom>
-        </p:spPr>
-      </p:pic>
-    </p:spTree>
-  </p:cSld>
-  <p:clrMapOvr>
-    <a:masterClrMapping/>
-  </p:clrMapOvr>
-</p:sldLayout>
-</file>
-
-<file path=ppt/slideLayouts/slideLayout12.xml><?xml version="1.0" encoding="utf-8"?>
-<p:sldLayout xmlns:a="http://schemas.openxmlformats.org/drawingml/2006/main" xmlns:r="http://schemas.openxmlformats.org/officeDocument/2006/relationships" xmlns:p="http://schemas.openxmlformats.org/presentationml/2006/main" preserve="1" userDrawn="1">
-  <p:cSld name="1_仅标题">
-    <p:spTree>
-      <p:nvGrpSpPr>
-        <p:cNvPr id="1" name=""/>
-        <p:cNvGrpSpPr/>
-        <p:nvPr/>
-      </p:nvGrpSpPr>
-      <p:grpSpPr>
-        <a:xfrm>
-          <a:off x="0" y="0"/>
-          <a:ext cx="0" cy="0"/>
-          <a:chOff x="0" y="0"/>
-          <a:chExt cx="0" cy="0"/>
-        </a:xfrm>
-      </p:grpSpPr>
-      <p:pic>
-        <p:nvPicPr>
-          <p:cNvPr id="8" name="图片 7" descr="内页">
-            <a:extLst>
-              <a:ext uri="{FF2B5EF4-FFF2-40B4-BE49-F238E27FC236}">
-                <a16:creationId xmlns:a16="http://schemas.microsoft.com/office/drawing/2014/main" id="{946D447C-3ABE-4E84-C411-767D231F9DE6}"/>
-              </a:ext>
-            </a:extLst>
-          </p:cNvPr>
-          <p:cNvPicPr>
-            <a:picLocks noChangeAspect="1"/>
-          </p:cNvPicPr>
-          <p:nvPr userDrawn="1"/>
-        </p:nvPicPr>
-        <p:blipFill>
-          <a:blip r:embed="rId2">
-            <a:alphaModFix amt="70000"/>
-          </a:blip>
-          <a:srcRect/>
-          <a:stretch/>
-        </p:blipFill>
-        <p:spPr>
-          <a:xfrm>
-            <a:off x="0" y="0"/>
-            <a:ext cx="12192000" cy="6858000"/>
-          </a:xfrm>
-          <a:prstGeom prst="rect">
-            <a:avLst/>
-          </a:prstGeom>
-        </p:spPr>
-      </p:pic>
-      <p:pic>
-        <p:nvPicPr>
-          <p:cNvPr id="7" name="图片 6" descr="logo">
-            <a:extLst>
-              <a:ext uri="{FF2B5EF4-FFF2-40B4-BE49-F238E27FC236}">
-                <a16:creationId xmlns:a16="http://schemas.microsoft.com/office/drawing/2014/main" id="{B33223AF-920E-B0E1-9FD6-5A68D1745694}"/>
-              </a:ext>
-            </a:extLst>
-          </p:cNvPr>
-          <p:cNvPicPr>
-            <a:picLocks noChangeAspect="1"/>
-          </p:cNvPicPr>
-          <p:nvPr userDrawn="1"/>
-        </p:nvPicPr>
-        <p:blipFill>
-          <a:blip r:embed="rId3"/>
-          <a:stretch>
-            <a:fillRect/>
-          </a:stretch>
-        </p:blipFill>
-        <p:spPr>
-          <a:xfrm>
-            <a:off x="10333495" y="422275"/>
-            <a:ext cx="1551305" cy="474345"/>
-          </a:xfrm>
-          <a:prstGeom prst="rect">
-            <a:avLst/>
-          </a:prstGeom>
-        </p:spPr>
-      </p:pic>
-      <p:sp>
-        <p:nvSpPr>
-          <p:cNvPr id="5" name="标题 1">
-            <a:extLst>
-              <a:ext uri="{FF2B5EF4-FFF2-40B4-BE49-F238E27FC236}">
-                <a16:creationId xmlns:a16="http://schemas.microsoft.com/office/drawing/2014/main" id="{89C71938-62F0-5B4A-B5D5-453857A58202}"/>
-              </a:ext>
-            </a:extLst>
-          </p:cNvPr>
-          <p:cNvSpPr>
-            <a:spLocks noGrp="1"/>
-          </p:cNvSpPr>
-          <p:nvPr>
-            <p:ph type="title"/>
-          </p:nvPr>
-        </p:nvSpPr>
-        <p:spPr>
-          <a:xfrm>
-            <a:off x="608400" y="288360"/>
-            <a:ext cx="10969200" cy="705600"/>
-          </a:xfrm>
-        </p:spPr>
-        <p:txBody>
-          <a:bodyPr/>
-          <a:lstStyle/>
-          <a:p>
-            <a:endParaRPr lang="zh-CN" altLang="en-US" dirty="0"/>
-          </a:p>
-        </p:txBody>
-      </p:sp>
-    </p:spTree>
-    <p:extLst>
-      <p:ext uri="{BB962C8B-B14F-4D97-AF65-F5344CB8AC3E}">
-        <p14:creationId xmlns:p14="http://schemas.microsoft.com/office/powerpoint/2010/main" val="2281842546"/>
-      </p:ext>
-    </p:extLst>
-  </p:cSld>
-  <p:clrMapOvr>
-    <a:masterClrMapping/>
-  </p:clrMapOvr>
-</p:sldLayout>
-</file>
-
-<file path=ppt/slideLayouts/slideLayout13.xml><?xml version="1.0" encoding="utf-8"?>
-<p:sldLayout xmlns:a="http://schemas.openxmlformats.org/drawingml/2006/main" xmlns:r="http://schemas.openxmlformats.org/officeDocument/2006/relationships" xmlns:p="http://schemas.openxmlformats.org/presentationml/2006/main" type="titleOnly" preserve="1">
-  <p:cSld name="仅标题">
-    <p:spTree>
-      <p:nvGrpSpPr>
-        <p:cNvPr id="1" name=""/>
-        <p:cNvGrpSpPr/>
-        <p:nvPr/>
-      </p:nvGrpSpPr>
-      <p:grpSpPr>
-        <a:xfrm>
-          <a:off x="0" y="0"/>
-          <a:ext cx="0" cy="0"/>
-          <a:chOff x="0" y="0"/>
-          <a:chExt cx="0" cy="0"/>
-        </a:xfrm>
-      </p:grpSpPr>
-      <p:pic>
-        <p:nvPicPr>
-          <p:cNvPr id="10" name="图片 9" descr="内页2">
-            <a:extLst>
-              <a:ext uri="{FF2B5EF4-FFF2-40B4-BE49-F238E27FC236}">
-                <a16:creationId xmlns:a16="http://schemas.microsoft.com/office/drawing/2014/main" id="{8E5E73B0-7D28-2A35-DB7A-F32209627A62}"/>
-              </a:ext>
-            </a:extLst>
-          </p:cNvPr>
-          <p:cNvPicPr>
-            <a:picLocks noChangeAspect="1"/>
-          </p:cNvPicPr>
-          <p:nvPr userDrawn="1"/>
-        </p:nvPicPr>
-        <p:blipFill>
-          <a:blip r:embed="rId3">
-            <a:alphaModFix amt="35000"/>
-          </a:blip>
-          <a:stretch>
-            <a:fillRect/>
-          </a:stretch>
-        </p:blipFill>
-        <p:spPr>
-          <a:xfrm>
-            <a:off x="0" y="0"/>
-            <a:ext cx="12192000" cy="6858000"/>
-          </a:xfrm>
-          <a:prstGeom prst="rect">
-            <a:avLst/>
-          </a:prstGeom>
-        </p:spPr>
-      </p:pic>
-      <p:sp>
-        <p:nvSpPr>
-          <p:cNvPr id="2" name="标题 1"/>
-          <p:cNvSpPr>
-            <a:spLocks noGrp="1"/>
-          </p:cNvSpPr>
-          <p:nvPr>
-            <p:ph type="title"/>
-            <p:custDataLst>
-              <p:tags r:id="rId1"/>
-            </p:custDataLst>
-          </p:nvPr>
-        </p:nvSpPr>
-        <p:spPr>
-          <a:xfrm>
-            <a:off x="608400" y="608400"/>
-            <a:ext cx="10969200" cy="705600"/>
-          </a:xfrm>
-        </p:spPr>
-        <p:txBody>
-          <a:bodyPr vert="horz" lIns="90000" tIns="46800" rIns="90000" bIns="46800" rtlCol="0" anchor="ctr" anchorCtr="0">
-            <a:normAutofit/>
-          </a:bodyPr>
-          <a:lstStyle/>
-          <a:p>
-            <a:pPr lvl="0"/>
-            <a:r>
-              <a:rPr lang="zh-CN" altLang="en-US"/>
-              <a:t>单击此处编辑母版标题样式</a:t>
-            </a:r>
-          </a:p>
-        </p:txBody>
-      </p:sp>
-      <p:pic>
-        <p:nvPicPr>
-          <p:cNvPr id="7" name="图片 6" descr="logo">
-            <a:extLst>
-              <a:ext uri="{FF2B5EF4-FFF2-40B4-BE49-F238E27FC236}">
-                <a16:creationId xmlns:a16="http://schemas.microsoft.com/office/drawing/2014/main" id="{B33223AF-920E-B0E1-9FD6-5A68D1745694}"/>
-              </a:ext>
-            </a:extLst>
-          </p:cNvPr>
-          <p:cNvPicPr>
-            <a:picLocks noChangeAspect="1"/>
-          </p:cNvPicPr>
-          <p:nvPr userDrawn="1"/>
-        </p:nvPicPr>
-        <p:blipFill>
-          <a:blip r:embed="rId4"/>
-          <a:stretch>
-            <a:fillRect/>
-          </a:stretch>
-        </p:blipFill>
-        <p:spPr>
-          <a:xfrm>
-            <a:off x="10333495" y="422275"/>
-            <a:ext cx="1551305" cy="474345"/>
-          </a:xfrm>
-          <a:prstGeom prst="rect">
-            <a:avLst/>
-          </a:prstGeom>
-        </p:spPr>
-      </p:pic>
-    </p:spTree>
-  </p:cSld>
-  <p:clrMapOvr>
-    <a:masterClrMapping/>
-  </p:clrMapOvr>
-</p:sldLayout>
-</file>
-
-<file path=ppt/slideLayouts/slideLayout14.xml><?xml version="1.0" encoding="utf-8"?>
-<p:sldLayout xmlns:a="http://schemas.openxmlformats.org/drawingml/2006/main" xmlns:r="http://schemas.openxmlformats.org/officeDocument/2006/relationships" xmlns:p="http://schemas.openxmlformats.org/presentationml/2006/main" type="blank" preserve="1">
-  <p:cSld name="空白">
-    <p:spTree>
-      <p:nvGrpSpPr>
-        <p:cNvPr id="1" name=""/>
-        <p:cNvGrpSpPr/>
-        <p:nvPr/>
-      </p:nvGrpSpPr>
-      <p:grpSpPr>
-        <a:xfrm>
-          <a:off x="0" y="0"/>
-          <a:ext cx="0" cy="0"/>
-          <a:chOff x="0" y="0"/>
-          <a:chExt cx="0" cy="0"/>
-        </a:xfrm>
-      </p:grpSpPr>
-      <p:pic>
-        <p:nvPicPr>
-          <p:cNvPr id="6" name="图片 5" descr="内页">
-            <a:extLst>
-              <a:ext uri="{FF2B5EF4-FFF2-40B4-BE49-F238E27FC236}">
-                <a16:creationId xmlns:a16="http://schemas.microsoft.com/office/drawing/2014/main" id="{FDD1047B-D210-7E43-40DF-E4C3E15C5120}"/>
-              </a:ext>
-            </a:extLst>
-          </p:cNvPr>
-          <p:cNvPicPr>
-            <a:picLocks noChangeAspect="1"/>
-          </p:cNvPicPr>
-          <p:nvPr userDrawn="1"/>
-        </p:nvPicPr>
-        <p:blipFill>
-          <a:blip r:embed="rId2">
-            <a:alphaModFix amt="70000"/>
-          </a:blip>
-          <a:srcRect/>
-          <a:stretch/>
-        </p:blipFill>
-        <p:spPr>
-          <a:xfrm>
-            <a:off x="0" y="0"/>
-            <a:ext cx="12192000" cy="6858000"/>
-          </a:xfrm>
-          <a:prstGeom prst="rect">
-            <a:avLst/>
-          </a:prstGeom>
-        </p:spPr>
-      </p:pic>
-      <p:pic>
-        <p:nvPicPr>
-          <p:cNvPr id="5" name="图片 4" descr="logo">
-            <a:extLst>
-              <a:ext uri="{FF2B5EF4-FFF2-40B4-BE49-F238E27FC236}">
-                <a16:creationId xmlns:a16="http://schemas.microsoft.com/office/drawing/2014/main" id="{60A5301D-39E6-79B6-2F25-CD263BDAAD15}"/>
-              </a:ext>
-            </a:extLst>
-          </p:cNvPr>
-          <p:cNvPicPr>
-            <a:picLocks noChangeAspect="1"/>
-          </p:cNvPicPr>
-          <p:nvPr userDrawn="1"/>
-        </p:nvPicPr>
-        <p:blipFill>
-          <a:blip r:embed="rId3"/>
-          <a:stretch>
-            <a:fillRect/>
-          </a:stretch>
-        </p:blipFill>
-        <p:spPr>
-          <a:xfrm>
-            <a:off x="10333495" y="422275"/>
-            <a:ext cx="1551305" cy="474345"/>
-          </a:xfrm>
-          <a:prstGeom prst="rect">
-            <a:avLst/>
-          </a:prstGeom>
-        </p:spPr>
-      </p:pic>
-    </p:spTree>
-  </p:cSld>
-  <p:clrMapOvr>
-    <a:masterClrMapping/>
-  </p:clrMapOvr>
-</p:sldLayout>
-</file>
-
-<file path=ppt/slideLayouts/slideLayout15.xml><?xml version="1.0" encoding="utf-8"?>
-<p:sldLayout xmlns:a="http://schemas.openxmlformats.org/drawingml/2006/main" xmlns:r="http://schemas.openxmlformats.org/officeDocument/2006/relationships" xmlns:p="http://schemas.openxmlformats.org/presentationml/2006/main" type="blank" preserve="1">
-  <p:cSld name="1_空白">
-    <p:spTree>
-      <p:nvGrpSpPr>
-        <p:cNvPr id="1" name=""/>
-        <p:cNvGrpSpPr/>
-        <p:nvPr/>
-      </p:nvGrpSpPr>
-      <p:grpSpPr>
-        <a:xfrm>
-          <a:off x="0" y="0"/>
-          <a:ext cx="0" cy="0"/>
-          <a:chOff x="0" y="0"/>
-          <a:chExt cx="0" cy="0"/>
-        </a:xfrm>
-      </p:grpSpPr>
-      <p:pic>
-        <p:nvPicPr>
-          <p:cNvPr id="2" name="图片 1" descr="内页2">
-            <a:extLst>
-              <a:ext uri="{FF2B5EF4-FFF2-40B4-BE49-F238E27FC236}">
-                <a16:creationId xmlns:a16="http://schemas.microsoft.com/office/drawing/2014/main" id="{28AC87B4-3EE6-4D03-56E0-9D4CCF88FD24}"/>
-              </a:ext>
-            </a:extLst>
-          </p:cNvPr>
-          <p:cNvPicPr>
-            <a:picLocks noChangeAspect="1"/>
-          </p:cNvPicPr>
-          <p:nvPr userDrawn="1"/>
-        </p:nvPicPr>
-        <p:blipFill>
-          <a:blip r:embed="rId2">
-            <a:alphaModFix amt="35000"/>
-          </a:blip>
-          <a:stretch>
-            <a:fillRect/>
-          </a:stretch>
-        </p:blipFill>
-        <p:spPr>
-          <a:xfrm>
-            <a:off x="0" y="0"/>
-            <a:ext cx="12192000" cy="6858000"/>
-          </a:xfrm>
-          <a:prstGeom prst="rect">
-            <a:avLst/>
-          </a:prstGeom>
-        </p:spPr>
-      </p:pic>
-      <p:pic>
-        <p:nvPicPr>
-          <p:cNvPr id="5" name="图片 4" descr="logo">
-            <a:extLst>
-              <a:ext uri="{FF2B5EF4-FFF2-40B4-BE49-F238E27FC236}">
-                <a16:creationId xmlns:a16="http://schemas.microsoft.com/office/drawing/2014/main" id="{60A5301D-39E6-79B6-2F25-CD263BDAAD15}"/>
-              </a:ext>
-            </a:extLst>
-          </p:cNvPr>
-          <p:cNvPicPr>
-            <a:picLocks noChangeAspect="1"/>
-          </p:cNvPicPr>
-          <p:nvPr userDrawn="1"/>
-        </p:nvPicPr>
-        <p:blipFill>
-          <a:blip r:embed="rId3"/>
-          <a:stretch>
-            <a:fillRect/>
-          </a:stretch>
-        </p:blipFill>
-        <p:spPr>
-          <a:xfrm>
-            <a:off x="10333495" y="422275"/>
-            <a:ext cx="1551305" cy="474345"/>
-          </a:xfrm>
-          <a:prstGeom prst="rect">
-            <a:avLst/>
-          </a:prstGeom>
-        </p:spPr>
-      </p:pic>
-    </p:spTree>
-    <p:extLst>
-      <p:ext uri="{BB962C8B-B14F-4D97-AF65-F5344CB8AC3E}">
-        <p14:creationId xmlns:p14="http://schemas.microsoft.com/office/powerpoint/2010/main" val="2493093708"/>
-      </p:ext>
-    </p:extLst>
-  </p:cSld>
-  <p:clrMapOvr>
-    <a:masterClrMapping/>
-  </p:clrMapOvr>
-</p:sldLayout>
-</file>
-
-<file path=ppt/slideLayouts/slideLayout16.xml><?xml version="1.0" encoding="utf-8"?>
 <p:sldLayout xmlns:a="http://schemas.openxmlformats.org/drawingml/2006/main" xmlns:r="http://schemas.openxmlformats.org/officeDocument/2006/relationships" xmlns:p="http://schemas.openxmlformats.org/presentationml/2006/main" preserve="1" userDrawn="1">
   <p:cSld name="1_内容">
     <p:spTree>
@@ -1300,6 +543,41 @@
           </a:prstGeom>
         </p:spPr>
       </p:pic>
+      <p:pic>
+        <p:nvPicPr>
+          <p:cNvPr id="3" name="图片 2">
+            <a:extLst>
+              <a:ext uri="{FF2B5EF4-FFF2-40B4-BE49-F238E27FC236}">
+                <a16:creationId xmlns:a16="http://schemas.microsoft.com/office/drawing/2014/main" id="{16A21B68-76BF-6580-AF5A-4270FDF52852}"/>
+              </a:ext>
+            </a:extLst>
+          </p:cNvPr>
+          <p:cNvPicPr>
+            <a:picLocks noChangeAspect="1"/>
+          </p:cNvPicPr>
+          <p:nvPr userDrawn="1"/>
+        </p:nvPicPr>
+        <p:blipFill>
+          <a:blip r:embed="rId5" cstate="print">
+            <a:extLst>
+              <a:ext uri="{28A0092B-C50C-407E-A947-70E740481C1C}">
+                <a14:useLocalDpi xmlns:a14="http://schemas.microsoft.com/office/drawing/2010/main" val="0"/>
+              </a:ext>
+            </a:extLst>
+          </a:blip>
+          <a:srcRect/>
+          <a:stretch/>
+        </p:blipFill>
+        <p:spPr>
+          <a:xfrm>
+            <a:off x="277745" y="6370378"/>
+            <a:ext cx="2136271" cy="253740"/>
+          </a:xfrm>
+          <a:prstGeom prst="rect">
+            <a:avLst/>
+          </a:prstGeom>
+        </p:spPr>
+      </p:pic>
     </p:spTree>
     <p:extLst>
       <p:ext uri="{BB962C8B-B14F-4D97-AF65-F5344CB8AC3E}">
@@ -1313,153 +591,7 @@
 </p:sldLayout>
 </file>
 
-<file path=ppt/slideLayouts/slideLayout17.xml><?xml version="1.0" encoding="utf-8"?>
-<p:sldLayout xmlns:a="http://schemas.openxmlformats.org/drawingml/2006/main" xmlns:r="http://schemas.openxmlformats.org/officeDocument/2006/relationships" xmlns:p="http://schemas.openxmlformats.org/presentationml/2006/main" preserve="1" userDrawn="1">
-  <p:cSld name="内容">
-    <p:spTree>
-      <p:nvGrpSpPr>
-        <p:cNvPr id="1" name=""/>
-        <p:cNvGrpSpPr/>
-        <p:nvPr/>
-      </p:nvGrpSpPr>
-      <p:grpSpPr>
-        <a:xfrm>
-          <a:off x="0" y="0"/>
-          <a:ext cx="0" cy="0"/>
-          <a:chOff x="0" y="0"/>
-          <a:chExt cx="0" cy="0"/>
-        </a:xfrm>
-      </p:grpSpPr>
-      <p:pic>
-        <p:nvPicPr>
-          <p:cNvPr id="8" name="图片 7" descr="内页2">
-            <a:extLst>
-              <a:ext uri="{FF2B5EF4-FFF2-40B4-BE49-F238E27FC236}">
-                <a16:creationId xmlns:a16="http://schemas.microsoft.com/office/drawing/2014/main" id="{57D11493-2724-D18A-6375-BEC0CB28D8A5}"/>
-              </a:ext>
-            </a:extLst>
-          </p:cNvPr>
-          <p:cNvPicPr>
-            <a:picLocks noChangeAspect="1"/>
-          </p:cNvPicPr>
-          <p:nvPr userDrawn="1"/>
-        </p:nvPicPr>
-        <p:blipFill>
-          <a:blip r:embed="rId3">
-            <a:alphaModFix amt="35000"/>
-          </a:blip>
-          <a:stretch>
-            <a:fillRect/>
-          </a:stretch>
-        </p:blipFill>
-        <p:spPr>
-          <a:xfrm>
-            <a:off x="0" y="0"/>
-            <a:ext cx="12192000" cy="6858000"/>
-          </a:xfrm>
-          <a:prstGeom prst="rect">
-            <a:avLst/>
-          </a:prstGeom>
-        </p:spPr>
-      </p:pic>
-      <p:sp>
-        <p:nvSpPr>
-          <p:cNvPr id="7" name="内容占位符 6"/>
-          <p:cNvSpPr>
-            <a:spLocks noGrp="1"/>
-          </p:cNvSpPr>
-          <p:nvPr>
-            <p:ph sz="quarter" idx="13"/>
-            <p:custDataLst>
-              <p:tags r:id="rId1"/>
-            </p:custDataLst>
-          </p:nvPr>
-        </p:nvSpPr>
-        <p:spPr>
-          <a:xfrm>
-            <a:off x="608400" y="774000"/>
-            <a:ext cx="10972800" cy="5123880"/>
-          </a:xfrm>
-        </p:spPr>
-        <p:txBody>
-          <a:bodyPr/>
-          <a:lstStyle/>
-          <a:p>
-            <a:pPr lvl="0"/>
-            <a:r>
-              <a:rPr lang="zh-CN" altLang="en-US" dirty="0"/>
-              <a:t>单击此处编辑母版文本样式</a:t>
-            </a:r>
-          </a:p>
-          <a:p>
-            <a:pPr lvl="1"/>
-            <a:r>
-              <a:rPr lang="zh-CN" altLang="en-US" dirty="0"/>
-              <a:t>第二级</a:t>
-            </a:r>
-          </a:p>
-          <a:p>
-            <a:pPr lvl="2"/>
-            <a:r>
-              <a:rPr lang="zh-CN" altLang="en-US" dirty="0"/>
-              <a:t>第三级</a:t>
-            </a:r>
-          </a:p>
-          <a:p>
-            <a:pPr lvl="3"/>
-            <a:r>
-              <a:rPr lang="zh-CN" altLang="en-US" dirty="0"/>
-              <a:t>第四级</a:t>
-            </a:r>
-          </a:p>
-          <a:p>
-            <a:pPr lvl="4"/>
-            <a:r>
-              <a:rPr lang="zh-CN" altLang="en-US" dirty="0"/>
-              <a:t>第五级</a:t>
-            </a:r>
-          </a:p>
-        </p:txBody>
-      </p:sp>
-      <p:pic>
-        <p:nvPicPr>
-          <p:cNvPr id="2" name="图片 1" descr="logo">
-            <a:extLst>
-              <a:ext uri="{FF2B5EF4-FFF2-40B4-BE49-F238E27FC236}">
-                <a16:creationId xmlns:a16="http://schemas.microsoft.com/office/drawing/2014/main" id="{1B19E2FA-DC8F-5BAD-D111-A532946AA49B}"/>
-              </a:ext>
-            </a:extLst>
-          </p:cNvPr>
-          <p:cNvPicPr>
-            <a:picLocks noChangeAspect="1"/>
-          </p:cNvPicPr>
-          <p:nvPr userDrawn="1"/>
-        </p:nvPicPr>
-        <p:blipFill>
-          <a:blip r:embed="rId4"/>
-          <a:stretch>
-            <a:fillRect/>
-          </a:stretch>
-        </p:blipFill>
-        <p:spPr>
-          <a:xfrm>
-            <a:off x="10333495" y="422275"/>
-            <a:ext cx="1551305" cy="474345"/>
-          </a:xfrm>
-          <a:prstGeom prst="rect">
-            <a:avLst/>
-          </a:prstGeom>
-        </p:spPr>
-      </p:pic>
-    </p:spTree>
-  </p:cSld>
-  <p:clrMapOvr>
-    <a:masterClrMapping/>
-  </p:clrMapOvr>
-</p:sldLayout>
-</file>
-
-<file path=ppt/slideLayouts/slideLayout18.xml><?xml version="1.0" encoding="utf-8"?>
+<file path=ppt/slideLayouts/slideLayout11.xml><?xml version="1.0" encoding="utf-8"?>
 <p:sldLayout xmlns:a="http://schemas.openxmlformats.org/drawingml/2006/main" xmlns:r="http://schemas.openxmlformats.org/officeDocument/2006/relationships" xmlns:p="http://schemas.openxmlformats.org/presentationml/2006/main" preserve="1" userDrawn="1">
   <p:cSld name="末尾幻灯片">
     <p:spTree>
@@ -1478,7 +610,7 @@
       </p:grpSpPr>
       <p:pic>
         <p:nvPicPr>
-          <p:cNvPr id="6" name="图片 5" descr="封面-无文字">
+          <p:cNvPr id="6" name="图片 5">
             <a:extLst>
               <a:ext uri="{FF2B5EF4-FFF2-40B4-BE49-F238E27FC236}">
                 <a16:creationId xmlns:a16="http://schemas.microsoft.com/office/drawing/2014/main" id="{839E0CB9-EF1D-6026-0573-A2761273D7DD}"/>
@@ -1491,10 +623,15 @@
           <p:nvPr userDrawn="1"/>
         </p:nvPicPr>
         <p:blipFill>
-          <a:blip r:embed="rId5"/>
-          <a:stretch>
-            <a:fillRect/>
-          </a:stretch>
+          <a:blip r:embed="rId5">
+            <a:extLst>
+              <a:ext uri="{28A0092B-C50C-407E-A947-70E740481C1C}">
+                <a14:useLocalDpi xmlns:a14="http://schemas.microsoft.com/office/drawing/2010/main" val="0"/>
+              </a:ext>
+            </a:extLst>
+          </a:blip>
+          <a:srcRect/>
+          <a:stretch/>
         </p:blipFill>
         <p:spPr>
           <a:xfrm>
@@ -1526,7 +663,7 @@
           <a:p>
             <a:fld id="{760FBDFE-C587-4B4C-A407-44438C67B59E}" type="datetimeFigureOut">
               <a:rPr lang="zh-CN" altLang="en-US" smtClean="0"/>
-              <a:t>2024/9/3</a:t>
+              <a:t>2024/9/17</a:t>
             </a:fld>
             <a:endParaRPr lang="zh-CN" altLang="en-US"/>
           </a:p>
@@ -1640,6 +777,41 @@
           <a:xfrm>
             <a:off x="0" y="100885"/>
             <a:ext cx="12192000" cy="6324600"/>
+          </a:xfrm>
+          <a:prstGeom prst="rect">
+            <a:avLst/>
+          </a:prstGeom>
+        </p:spPr>
+      </p:pic>
+      <p:pic>
+        <p:nvPicPr>
+          <p:cNvPr id="7" name="图片 6">
+            <a:extLst>
+              <a:ext uri="{FF2B5EF4-FFF2-40B4-BE49-F238E27FC236}">
+                <a16:creationId xmlns:a16="http://schemas.microsoft.com/office/drawing/2014/main" id="{7868780C-1FC2-81F5-BF64-2E817AB5BED3}"/>
+              </a:ext>
+            </a:extLst>
+          </p:cNvPr>
+          <p:cNvPicPr>
+            <a:picLocks noChangeAspect="1"/>
+          </p:cNvPicPr>
+          <p:nvPr userDrawn="1"/>
+        </p:nvPicPr>
+        <p:blipFill>
+          <a:blip r:embed="rId8" cstate="print">
+            <a:extLst>
+              <a:ext uri="{28A0092B-C50C-407E-A947-70E740481C1C}">
+                <a14:useLocalDpi xmlns:a14="http://schemas.microsoft.com/office/drawing/2010/main" val="0"/>
+              </a:ext>
+            </a:extLst>
+          </a:blip>
+          <a:srcRect/>
+          <a:stretch/>
+        </p:blipFill>
+        <p:spPr>
+          <a:xfrm>
+            <a:off x="9357737" y="499930"/>
+            <a:ext cx="2315468" cy="275024"/>
           </a:xfrm>
           <a:prstGeom prst="rect">
             <a:avLst/>
@@ -1673,7 +845,7 @@
       </p:grpSpPr>
       <p:pic>
         <p:nvPicPr>
-          <p:cNvPr id="6" name="图片 5" descr="封面-无文字">
+          <p:cNvPr id="6" name="图片 5">
             <a:extLst>
               <a:ext uri="{FF2B5EF4-FFF2-40B4-BE49-F238E27FC236}">
                 <a16:creationId xmlns:a16="http://schemas.microsoft.com/office/drawing/2014/main" id="{BF7151EB-9391-1B4D-A660-4877C999F947}"/>
@@ -1686,10 +858,15 @@
           <p:nvPr userDrawn="1"/>
         </p:nvPicPr>
         <p:blipFill>
-          <a:blip r:embed="rId2"/>
-          <a:stretch>
-            <a:fillRect/>
-          </a:stretch>
+          <a:blip r:embed="rId2">
+            <a:extLst>
+              <a:ext uri="{28A0092B-C50C-407E-A947-70E740481C1C}">
+                <a14:useLocalDpi xmlns:a14="http://schemas.microsoft.com/office/drawing/2010/main" val="0"/>
+              </a:ext>
+            </a:extLst>
+          </a:blip>
+          <a:srcRect/>
+          <a:stretch/>
         </p:blipFill>
         <p:spPr>
           <a:xfrm>
@@ -1815,6 +992,41 @@
           </a:prstGeom>
         </p:spPr>
       </p:pic>
+      <p:pic>
+        <p:nvPicPr>
+          <p:cNvPr id="3" name="图片 2">
+            <a:extLst>
+              <a:ext uri="{FF2B5EF4-FFF2-40B4-BE49-F238E27FC236}">
+                <a16:creationId xmlns:a16="http://schemas.microsoft.com/office/drawing/2014/main" id="{DC808774-5261-35F1-7F36-F1AF9CF7835C}"/>
+              </a:ext>
+            </a:extLst>
+          </p:cNvPr>
+          <p:cNvPicPr>
+            <a:picLocks noChangeAspect="1"/>
+          </p:cNvPicPr>
+          <p:nvPr userDrawn="1"/>
+        </p:nvPicPr>
+        <p:blipFill>
+          <a:blip r:embed="rId5" cstate="print">
+            <a:extLst>
+              <a:ext uri="{28A0092B-C50C-407E-A947-70E740481C1C}">
+                <a14:useLocalDpi xmlns:a14="http://schemas.microsoft.com/office/drawing/2010/main" val="0"/>
+              </a:ext>
+            </a:extLst>
+          </a:blip>
+          <a:srcRect/>
+          <a:stretch/>
+        </p:blipFill>
+        <p:spPr>
+          <a:xfrm>
+            <a:off x="9357737" y="499930"/>
+            <a:ext cx="2315468" cy="275024"/>
+          </a:xfrm>
+          <a:prstGeom prst="rect">
+            <a:avLst/>
+          </a:prstGeom>
+        </p:spPr>
+      </p:pic>
     </p:spTree>
     <p:extLst>
       <p:ext uri="{BB962C8B-B14F-4D97-AF65-F5344CB8AC3E}">
@@ -1829,369 +1041,6 @@
 </file>
 
 <file path=ppt/slideLayouts/slideLayout3.xml><?xml version="1.0" encoding="utf-8"?>
-<p:sldLayout xmlns:a="http://schemas.openxmlformats.org/drawingml/2006/main" xmlns:r="http://schemas.openxmlformats.org/officeDocument/2006/relationships" xmlns:p="http://schemas.openxmlformats.org/presentationml/2006/main" preserve="1" userDrawn="1">
-  <p:cSld name="标题和内容">
-    <p:spTree>
-      <p:nvGrpSpPr>
-        <p:cNvPr id="1" name=""/>
-        <p:cNvGrpSpPr/>
-        <p:nvPr/>
-      </p:nvGrpSpPr>
-      <p:grpSpPr>
-        <a:xfrm>
-          <a:off x="0" y="0"/>
-          <a:ext cx="0" cy="0"/>
-          <a:chOff x="0" y="0"/>
-          <a:chExt cx="0" cy="0"/>
-        </a:xfrm>
-      </p:grpSpPr>
-      <p:pic>
-        <p:nvPicPr>
-          <p:cNvPr id="7" name="图片 6" descr="内页">
-            <a:extLst>
-              <a:ext uri="{FF2B5EF4-FFF2-40B4-BE49-F238E27FC236}">
-                <a16:creationId xmlns:a16="http://schemas.microsoft.com/office/drawing/2014/main" id="{106E952C-9110-FBED-50AE-576F7C057322}"/>
-              </a:ext>
-            </a:extLst>
-          </p:cNvPr>
-          <p:cNvPicPr>
-            <a:picLocks noChangeAspect="1"/>
-          </p:cNvPicPr>
-          <p:nvPr userDrawn="1"/>
-        </p:nvPicPr>
-        <p:blipFill>
-          <a:blip r:embed="rId3">
-            <a:alphaModFix amt="70000"/>
-          </a:blip>
-          <a:srcRect/>
-          <a:stretch/>
-        </p:blipFill>
-        <p:spPr>
-          <a:xfrm>
-            <a:off x="0" y="0"/>
-            <a:ext cx="12192000" cy="6858000"/>
-          </a:xfrm>
-          <a:prstGeom prst="rect">
-            <a:avLst/>
-          </a:prstGeom>
-        </p:spPr>
-      </p:pic>
-      <p:sp>
-        <p:nvSpPr>
-          <p:cNvPr id="3" name="内容占位符 2"/>
-          <p:cNvSpPr>
-            <a:spLocks noGrp="1"/>
-          </p:cNvSpPr>
-          <p:nvPr>
-            <p:ph idx="1"/>
-            <p:custDataLst>
-              <p:tags r:id="rId1"/>
-            </p:custDataLst>
-          </p:nvPr>
-        </p:nvSpPr>
-        <p:spPr>
-          <a:xfrm>
-            <a:off x="608400" y="1181790"/>
-            <a:ext cx="10969200" cy="4759200"/>
-          </a:xfrm>
-        </p:spPr>
-        <p:txBody>
-          <a:bodyPr vert="horz" lIns="90000" tIns="46800" rIns="90000" bIns="46800" rtlCol="0">
-            <a:normAutofit/>
-          </a:bodyPr>
-          <a:lstStyle/>
-          <a:p>
-            <a:pPr lvl="0"/>
-            <a:r>
-              <a:rPr lang="zh-CN" altLang="en-US" dirty="0"/>
-              <a:t>单击此处编辑母版文本样式</a:t>
-            </a:r>
-          </a:p>
-          <a:p>
-            <a:pPr lvl="1"/>
-            <a:r>
-              <a:rPr lang="zh-CN" altLang="en-US" dirty="0"/>
-              <a:t>第二级</a:t>
-            </a:r>
-          </a:p>
-          <a:p>
-            <a:pPr lvl="2"/>
-            <a:r>
-              <a:rPr lang="zh-CN" altLang="en-US" dirty="0"/>
-              <a:t>第三级</a:t>
-            </a:r>
-          </a:p>
-          <a:p>
-            <a:pPr lvl="3"/>
-            <a:r>
-              <a:rPr lang="zh-CN" altLang="en-US" dirty="0"/>
-              <a:t>第四级</a:t>
-            </a:r>
-          </a:p>
-          <a:p>
-            <a:pPr lvl="4"/>
-            <a:r>
-              <a:rPr lang="zh-CN" altLang="en-US" dirty="0"/>
-              <a:t>第五级</a:t>
-            </a:r>
-          </a:p>
-        </p:txBody>
-      </p:sp>
-      <p:pic>
-        <p:nvPicPr>
-          <p:cNvPr id="8" name="图片 7" descr="logo">
-            <a:extLst>
-              <a:ext uri="{FF2B5EF4-FFF2-40B4-BE49-F238E27FC236}">
-                <a16:creationId xmlns:a16="http://schemas.microsoft.com/office/drawing/2014/main" id="{06C1AAAB-4FCE-1F72-D503-843088F2E89C}"/>
-              </a:ext>
-            </a:extLst>
-          </p:cNvPr>
-          <p:cNvPicPr>
-            <a:picLocks noChangeAspect="1"/>
-          </p:cNvPicPr>
-          <p:nvPr userDrawn="1"/>
-        </p:nvPicPr>
-        <p:blipFill>
-          <a:blip r:embed="rId4"/>
-          <a:stretch>
-            <a:fillRect/>
-          </a:stretch>
-        </p:blipFill>
-        <p:spPr>
-          <a:xfrm>
-            <a:off x="10333495" y="422275"/>
-            <a:ext cx="1551305" cy="474345"/>
-          </a:xfrm>
-          <a:prstGeom prst="rect">
-            <a:avLst/>
-          </a:prstGeom>
-        </p:spPr>
-      </p:pic>
-      <p:sp>
-        <p:nvSpPr>
-          <p:cNvPr id="6" name="标题 1">
-            <a:extLst>
-              <a:ext uri="{FF2B5EF4-FFF2-40B4-BE49-F238E27FC236}">
-                <a16:creationId xmlns:a16="http://schemas.microsoft.com/office/drawing/2014/main" id="{3FD0B5FD-E0A8-9D45-A7B1-EC99436AEE17}"/>
-              </a:ext>
-            </a:extLst>
-          </p:cNvPr>
-          <p:cNvSpPr>
-            <a:spLocks noGrp="1"/>
-          </p:cNvSpPr>
-          <p:nvPr>
-            <p:ph type="title"/>
-          </p:nvPr>
-        </p:nvSpPr>
-        <p:spPr>
-          <a:xfrm>
-            <a:off x="608400" y="288360"/>
-            <a:ext cx="10969200" cy="705600"/>
-          </a:xfrm>
-        </p:spPr>
-        <p:txBody>
-          <a:bodyPr/>
-          <a:lstStyle/>
-          <a:p>
-            <a:endParaRPr lang="zh-CN" altLang="en-US" dirty="0"/>
-          </a:p>
-        </p:txBody>
-      </p:sp>
-    </p:spTree>
-  </p:cSld>
-  <p:clrMapOvr>
-    <a:masterClrMapping/>
-  </p:clrMapOvr>
-</p:sldLayout>
-</file>
-
-<file path=ppt/slideLayouts/slideLayout4.xml><?xml version="1.0" encoding="utf-8"?>
-<p:sldLayout xmlns:a="http://schemas.openxmlformats.org/drawingml/2006/main" xmlns:r="http://schemas.openxmlformats.org/officeDocument/2006/relationships" xmlns:p="http://schemas.openxmlformats.org/presentationml/2006/main" type="obj" preserve="1">
-  <p:cSld name="1_标题和内容">
-    <p:spTree>
-      <p:nvGrpSpPr>
-        <p:cNvPr id="1" name=""/>
-        <p:cNvGrpSpPr/>
-        <p:nvPr/>
-      </p:nvGrpSpPr>
-      <p:grpSpPr>
-        <a:xfrm>
-          <a:off x="0" y="0"/>
-          <a:ext cx="0" cy="0"/>
-          <a:chOff x="0" y="0"/>
-          <a:chExt cx="0" cy="0"/>
-        </a:xfrm>
-      </p:grpSpPr>
-      <p:pic>
-        <p:nvPicPr>
-          <p:cNvPr id="5" name="图片 4" descr="内页2">
-            <a:extLst>
-              <a:ext uri="{FF2B5EF4-FFF2-40B4-BE49-F238E27FC236}">
-                <a16:creationId xmlns:a16="http://schemas.microsoft.com/office/drawing/2014/main" id="{461379B3-2B86-8AB4-5F2F-1A063A8957FA}"/>
-              </a:ext>
-            </a:extLst>
-          </p:cNvPr>
-          <p:cNvPicPr>
-            <a:picLocks noChangeAspect="1"/>
-          </p:cNvPicPr>
-          <p:nvPr userDrawn="1"/>
-        </p:nvPicPr>
-        <p:blipFill>
-          <a:blip r:embed="rId4">
-            <a:alphaModFix amt="50000"/>
-          </a:blip>
-          <a:stretch>
-            <a:fillRect/>
-          </a:stretch>
-        </p:blipFill>
-        <p:spPr>
-          <a:xfrm>
-            <a:off x="0" y="0"/>
-            <a:ext cx="12192000" cy="6858000"/>
-          </a:xfrm>
-          <a:prstGeom prst="rect">
-            <a:avLst/>
-          </a:prstGeom>
-        </p:spPr>
-      </p:pic>
-      <p:sp>
-        <p:nvSpPr>
-          <p:cNvPr id="2" name="标题 1"/>
-          <p:cNvSpPr>
-            <a:spLocks noGrp="1"/>
-          </p:cNvSpPr>
-          <p:nvPr>
-            <p:ph type="title"/>
-            <p:custDataLst>
-              <p:tags r:id="rId1"/>
-            </p:custDataLst>
-          </p:nvPr>
-        </p:nvSpPr>
-        <p:spPr>
-          <a:xfrm>
-            <a:off x="608400" y="608400"/>
-            <a:ext cx="10969200" cy="705600"/>
-          </a:xfrm>
-        </p:spPr>
-        <p:txBody>
-          <a:bodyPr vert="horz" lIns="90000" tIns="46800" rIns="90000" bIns="46800" rtlCol="0" anchor="ctr" anchorCtr="0">
-            <a:normAutofit/>
-          </a:bodyPr>
-          <a:lstStyle/>
-          <a:p>
-            <a:pPr lvl="0"/>
-            <a:r>
-              <a:rPr lang="zh-CN" altLang="en-US" dirty="0"/>
-              <a:t>单击此处编辑母版标题样式</a:t>
-            </a:r>
-          </a:p>
-        </p:txBody>
-      </p:sp>
-      <p:sp>
-        <p:nvSpPr>
-          <p:cNvPr id="3" name="内容占位符 2"/>
-          <p:cNvSpPr>
-            <a:spLocks noGrp="1"/>
-          </p:cNvSpPr>
-          <p:nvPr>
-            <p:ph idx="1"/>
-            <p:custDataLst>
-              <p:tags r:id="rId2"/>
-            </p:custDataLst>
-          </p:nvPr>
-        </p:nvSpPr>
-        <p:spPr>
-          <a:xfrm>
-            <a:off x="608400" y="1490400"/>
-            <a:ext cx="10969200" cy="4759200"/>
-          </a:xfrm>
-        </p:spPr>
-        <p:txBody>
-          <a:bodyPr vert="horz" lIns="90000" tIns="46800" rIns="90000" bIns="46800" rtlCol="0">
-            <a:normAutofit/>
-          </a:bodyPr>
-          <a:lstStyle/>
-          <a:p>
-            <a:pPr lvl="0"/>
-            <a:r>
-              <a:rPr lang="zh-CN" altLang="en-US" dirty="0"/>
-              <a:t>单击此处编辑母版文本样式</a:t>
-            </a:r>
-          </a:p>
-          <a:p>
-            <a:pPr lvl="1"/>
-            <a:r>
-              <a:rPr lang="zh-CN" altLang="en-US" dirty="0"/>
-              <a:t>第二级</a:t>
-            </a:r>
-          </a:p>
-          <a:p>
-            <a:pPr lvl="2"/>
-            <a:r>
-              <a:rPr lang="zh-CN" altLang="en-US" dirty="0"/>
-              <a:t>第三级</a:t>
-            </a:r>
-          </a:p>
-          <a:p>
-            <a:pPr lvl="3"/>
-            <a:r>
-              <a:rPr lang="zh-CN" altLang="en-US" dirty="0"/>
-              <a:t>第四级</a:t>
-            </a:r>
-          </a:p>
-          <a:p>
-            <a:pPr lvl="4"/>
-            <a:r>
-              <a:rPr lang="zh-CN" altLang="en-US" dirty="0"/>
-              <a:t>第五级</a:t>
-            </a:r>
-          </a:p>
-        </p:txBody>
-      </p:sp>
-      <p:pic>
-        <p:nvPicPr>
-          <p:cNvPr id="8" name="图片 7" descr="logo">
-            <a:extLst>
-              <a:ext uri="{FF2B5EF4-FFF2-40B4-BE49-F238E27FC236}">
-                <a16:creationId xmlns:a16="http://schemas.microsoft.com/office/drawing/2014/main" id="{06C1AAAB-4FCE-1F72-D503-843088F2E89C}"/>
-              </a:ext>
-            </a:extLst>
-          </p:cNvPr>
-          <p:cNvPicPr>
-            <a:picLocks noChangeAspect="1"/>
-          </p:cNvPicPr>
-          <p:nvPr userDrawn="1"/>
-        </p:nvPicPr>
-        <p:blipFill>
-          <a:blip r:embed="rId5"/>
-          <a:stretch>
-            <a:fillRect/>
-          </a:stretch>
-        </p:blipFill>
-        <p:spPr>
-          <a:xfrm>
-            <a:off x="10333495" y="422275"/>
-            <a:ext cx="1551305" cy="474345"/>
-          </a:xfrm>
-          <a:prstGeom prst="rect">
-            <a:avLst/>
-          </a:prstGeom>
-        </p:spPr>
-      </p:pic>
-    </p:spTree>
-    <p:extLst>
-      <p:ext uri="{BB962C8B-B14F-4D97-AF65-F5344CB8AC3E}">
-        <p14:creationId xmlns:p14="http://schemas.microsoft.com/office/powerpoint/2010/main" val="2545356175"/>
-      </p:ext>
-    </p:extLst>
-  </p:cSld>
-  <p:clrMapOvr>
-    <a:masterClrMapping/>
-  </p:clrMapOvr>
-</p:sldLayout>
-</file>
-
-<file path=ppt/slideLayouts/slideLayout5.xml><?xml version="1.0" encoding="utf-8"?>
 <p:sldLayout xmlns:a="http://schemas.openxmlformats.org/drawingml/2006/main" xmlns:r="http://schemas.openxmlformats.org/officeDocument/2006/relationships" xmlns:p="http://schemas.openxmlformats.org/presentationml/2006/main" type="secHead" preserve="1">
   <p:cSld name="节标题">
     <p:spTree>
@@ -2210,7 +1059,7 @@
       </p:grpSpPr>
       <p:pic>
         <p:nvPicPr>
-          <p:cNvPr id="7" name="图片 6" descr="封面-无文字">
+          <p:cNvPr id="7" name="图片 6">
             <a:extLst>
               <a:ext uri="{FF2B5EF4-FFF2-40B4-BE49-F238E27FC236}">
                 <a16:creationId xmlns:a16="http://schemas.microsoft.com/office/drawing/2014/main" id="{F2F58A4B-31DB-6882-8366-9FE8F42B2DF8}"/>
@@ -2223,10 +1072,15 @@
           <p:nvPr userDrawn="1"/>
         </p:nvPicPr>
         <p:blipFill>
-          <a:blip r:embed="rId4"/>
-          <a:stretch>
-            <a:fillRect/>
-          </a:stretch>
+          <a:blip r:embed="rId4">
+            <a:extLst>
+              <a:ext uri="{28A0092B-C50C-407E-A947-70E740481C1C}">
+                <a14:useLocalDpi xmlns:a14="http://schemas.microsoft.com/office/drawing/2010/main" val="0"/>
+              </a:ext>
+            </a:extLst>
+          </a:blip>
+          <a:srcRect/>
+          <a:stretch/>
         </p:blipFill>
         <p:spPr>
           <a:xfrm>
@@ -2465,6 +1319,41 @@
           </a:prstGeom>
         </p:spPr>
       </p:pic>
+      <p:pic>
+        <p:nvPicPr>
+          <p:cNvPr id="5" name="图片 4">
+            <a:extLst>
+              <a:ext uri="{FF2B5EF4-FFF2-40B4-BE49-F238E27FC236}">
+                <a16:creationId xmlns:a16="http://schemas.microsoft.com/office/drawing/2014/main" id="{378EE7A3-8C50-4A12-1A2E-1E2443246B16}"/>
+              </a:ext>
+            </a:extLst>
+          </p:cNvPr>
+          <p:cNvPicPr>
+            <a:picLocks noChangeAspect="1"/>
+          </p:cNvPicPr>
+          <p:nvPr userDrawn="1"/>
+        </p:nvPicPr>
+        <p:blipFill>
+          <a:blip r:embed="rId7" cstate="print">
+            <a:extLst>
+              <a:ext uri="{28A0092B-C50C-407E-A947-70E740481C1C}">
+                <a14:useLocalDpi xmlns:a14="http://schemas.microsoft.com/office/drawing/2010/main" val="0"/>
+              </a:ext>
+            </a:extLst>
+          </a:blip>
+          <a:srcRect/>
+          <a:stretch/>
+        </p:blipFill>
+        <p:spPr>
+          <a:xfrm>
+            <a:off x="9357737" y="499930"/>
+            <a:ext cx="2315468" cy="275024"/>
+          </a:xfrm>
+          <a:prstGeom prst="rect">
+            <a:avLst/>
+          </a:prstGeom>
+        </p:spPr>
+      </p:pic>
     </p:spTree>
   </p:cSld>
   <p:clrMapOvr>
@@ -2473,7 +1362,219 @@
 </p:sldLayout>
 </file>
 
-<file path=ppt/slideLayouts/slideLayout6.xml><?xml version="1.0" encoding="utf-8"?>
+<file path=ppt/slideLayouts/slideLayout4.xml><?xml version="1.0" encoding="utf-8"?>
+<p:sldLayout xmlns:a="http://schemas.openxmlformats.org/drawingml/2006/main" xmlns:r="http://schemas.openxmlformats.org/officeDocument/2006/relationships" xmlns:p="http://schemas.openxmlformats.org/presentationml/2006/main" preserve="1" userDrawn="1">
+  <p:cSld name="标题和内容">
+    <p:spTree>
+      <p:nvGrpSpPr>
+        <p:cNvPr id="1" name=""/>
+        <p:cNvGrpSpPr/>
+        <p:nvPr/>
+      </p:nvGrpSpPr>
+      <p:grpSpPr>
+        <a:xfrm>
+          <a:off x="0" y="0"/>
+          <a:ext cx="0" cy="0"/>
+          <a:chOff x="0" y="0"/>
+          <a:chExt cx="0" cy="0"/>
+        </a:xfrm>
+      </p:grpSpPr>
+      <p:pic>
+        <p:nvPicPr>
+          <p:cNvPr id="7" name="图片 6" descr="内页">
+            <a:extLst>
+              <a:ext uri="{FF2B5EF4-FFF2-40B4-BE49-F238E27FC236}">
+                <a16:creationId xmlns:a16="http://schemas.microsoft.com/office/drawing/2014/main" id="{106E952C-9110-FBED-50AE-576F7C057322}"/>
+              </a:ext>
+            </a:extLst>
+          </p:cNvPr>
+          <p:cNvPicPr>
+            <a:picLocks noChangeAspect="1"/>
+          </p:cNvPicPr>
+          <p:nvPr userDrawn="1"/>
+        </p:nvPicPr>
+        <p:blipFill>
+          <a:blip r:embed="rId3">
+            <a:alphaModFix amt="70000"/>
+          </a:blip>
+          <a:srcRect/>
+          <a:stretch/>
+        </p:blipFill>
+        <p:spPr>
+          <a:xfrm>
+            <a:off x="0" y="0"/>
+            <a:ext cx="12192000" cy="6858000"/>
+          </a:xfrm>
+          <a:prstGeom prst="rect">
+            <a:avLst/>
+          </a:prstGeom>
+        </p:spPr>
+      </p:pic>
+      <p:sp>
+        <p:nvSpPr>
+          <p:cNvPr id="3" name="内容占位符 2"/>
+          <p:cNvSpPr>
+            <a:spLocks noGrp="1"/>
+          </p:cNvSpPr>
+          <p:nvPr>
+            <p:ph idx="1"/>
+            <p:custDataLst>
+              <p:tags r:id="rId1"/>
+            </p:custDataLst>
+          </p:nvPr>
+        </p:nvSpPr>
+        <p:spPr>
+          <a:xfrm>
+            <a:off x="608400" y="1181790"/>
+            <a:ext cx="10969200" cy="4759200"/>
+          </a:xfrm>
+        </p:spPr>
+        <p:txBody>
+          <a:bodyPr vert="horz" lIns="90000" tIns="46800" rIns="90000" bIns="46800" rtlCol="0">
+            <a:normAutofit/>
+          </a:bodyPr>
+          <a:lstStyle/>
+          <a:p>
+            <a:pPr lvl="0"/>
+            <a:r>
+              <a:rPr lang="zh-CN" altLang="en-US" dirty="0"/>
+              <a:t>单击此处编辑母版文本样式</a:t>
+            </a:r>
+          </a:p>
+          <a:p>
+            <a:pPr lvl="1"/>
+            <a:r>
+              <a:rPr lang="zh-CN" altLang="en-US" dirty="0"/>
+              <a:t>第二级</a:t>
+            </a:r>
+          </a:p>
+          <a:p>
+            <a:pPr lvl="2"/>
+            <a:r>
+              <a:rPr lang="zh-CN" altLang="en-US" dirty="0"/>
+              <a:t>第三级</a:t>
+            </a:r>
+          </a:p>
+          <a:p>
+            <a:pPr lvl="3"/>
+            <a:r>
+              <a:rPr lang="zh-CN" altLang="en-US" dirty="0"/>
+              <a:t>第四级</a:t>
+            </a:r>
+          </a:p>
+          <a:p>
+            <a:pPr lvl="4"/>
+            <a:r>
+              <a:rPr lang="zh-CN" altLang="en-US" dirty="0"/>
+              <a:t>第五级</a:t>
+            </a:r>
+          </a:p>
+        </p:txBody>
+      </p:sp>
+      <p:pic>
+        <p:nvPicPr>
+          <p:cNvPr id="8" name="图片 7" descr="logo">
+            <a:extLst>
+              <a:ext uri="{FF2B5EF4-FFF2-40B4-BE49-F238E27FC236}">
+                <a16:creationId xmlns:a16="http://schemas.microsoft.com/office/drawing/2014/main" id="{06C1AAAB-4FCE-1F72-D503-843088F2E89C}"/>
+              </a:ext>
+            </a:extLst>
+          </p:cNvPr>
+          <p:cNvPicPr>
+            <a:picLocks noChangeAspect="1"/>
+          </p:cNvPicPr>
+          <p:nvPr userDrawn="1"/>
+        </p:nvPicPr>
+        <p:blipFill>
+          <a:blip r:embed="rId4"/>
+          <a:stretch>
+            <a:fillRect/>
+          </a:stretch>
+        </p:blipFill>
+        <p:spPr>
+          <a:xfrm>
+            <a:off x="10333495" y="422275"/>
+            <a:ext cx="1551305" cy="474345"/>
+          </a:xfrm>
+          <a:prstGeom prst="rect">
+            <a:avLst/>
+          </a:prstGeom>
+        </p:spPr>
+      </p:pic>
+      <p:sp>
+        <p:nvSpPr>
+          <p:cNvPr id="6" name="标题 1">
+            <a:extLst>
+              <a:ext uri="{FF2B5EF4-FFF2-40B4-BE49-F238E27FC236}">
+                <a16:creationId xmlns:a16="http://schemas.microsoft.com/office/drawing/2014/main" id="{3FD0B5FD-E0A8-9D45-A7B1-EC99436AEE17}"/>
+              </a:ext>
+            </a:extLst>
+          </p:cNvPr>
+          <p:cNvSpPr>
+            <a:spLocks noGrp="1"/>
+          </p:cNvSpPr>
+          <p:nvPr>
+            <p:ph type="title"/>
+          </p:nvPr>
+        </p:nvSpPr>
+        <p:spPr>
+          <a:xfrm>
+            <a:off x="608400" y="288360"/>
+            <a:ext cx="10969200" cy="705600"/>
+          </a:xfrm>
+        </p:spPr>
+        <p:txBody>
+          <a:bodyPr/>
+          <a:lstStyle/>
+          <a:p>
+            <a:endParaRPr lang="zh-CN" altLang="en-US" dirty="0"/>
+          </a:p>
+        </p:txBody>
+      </p:sp>
+      <p:pic>
+        <p:nvPicPr>
+          <p:cNvPr id="2" name="图片 1">
+            <a:extLst>
+              <a:ext uri="{FF2B5EF4-FFF2-40B4-BE49-F238E27FC236}">
+                <a16:creationId xmlns:a16="http://schemas.microsoft.com/office/drawing/2014/main" id="{BD20722D-9B4D-C739-87F5-FA58A01D03D8}"/>
+              </a:ext>
+            </a:extLst>
+          </p:cNvPr>
+          <p:cNvPicPr>
+            <a:picLocks noChangeAspect="1"/>
+          </p:cNvPicPr>
+          <p:nvPr userDrawn="1"/>
+        </p:nvPicPr>
+        <p:blipFill>
+          <a:blip r:embed="rId5" cstate="print">
+            <a:extLst>
+              <a:ext uri="{28A0092B-C50C-407E-A947-70E740481C1C}">
+                <a14:useLocalDpi xmlns:a14="http://schemas.microsoft.com/office/drawing/2010/main" val="0"/>
+              </a:ext>
+            </a:extLst>
+          </a:blip>
+          <a:srcRect/>
+          <a:stretch/>
+        </p:blipFill>
+        <p:spPr>
+          <a:xfrm>
+            <a:off x="277745" y="6370378"/>
+            <a:ext cx="2136271" cy="253740"/>
+          </a:xfrm>
+          <a:prstGeom prst="rect">
+            <a:avLst/>
+          </a:prstGeom>
+        </p:spPr>
+      </p:pic>
+    </p:spTree>
+  </p:cSld>
+  <p:clrMapOvr>
+    <a:masterClrMapping/>
+  </p:clrMapOvr>
+</p:sldLayout>
+</file>
+
+<file path=ppt/slideLayouts/slideLayout5.xml><?xml version="1.0" encoding="utf-8"?>
 <p:sldLayout xmlns:a="http://schemas.openxmlformats.org/drawingml/2006/main" xmlns:r="http://schemas.openxmlformats.org/officeDocument/2006/relationships" xmlns:p="http://schemas.openxmlformats.org/presentationml/2006/main" preserve="1" userDrawn="1">
   <p:cSld name="1_比较">
     <p:spTree>
@@ -2863,6 +1964,41 @@
           </a:p>
         </p:txBody>
       </p:sp>
+      <p:pic>
+        <p:nvPicPr>
+          <p:cNvPr id="2" name="图片 1">
+            <a:extLst>
+              <a:ext uri="{FF2B5EF4-FFF2-40B4-BE49-F238E27FC236}">
+                <a16:creationId xmlns:a16="http://schemas.microsoft.com/office/drawing/2014/main" id="{F9C913EF-8D67-6A86-6E67-B4772F1AA556}"/>
+              </a:ext>
+            </a:extLst>
+          </p:cNvPr>
+          <p:cNvPicPr>
+            <a:picLocks noChangeAspect="1"/>
+          </p:cNvPicPr>
+          <p:nvPr userDrawn="1"/>
+        </p:nvPicPr>
+        <p:blipFill>
+          <a:blip r:embed="rId8" cstate="print">
+            <a:extLst>
+              <a:ext uri="{28A0092B-C50C-407E-A947-70E740481C1C}">
+                <a14:useLocalDpi xmlns:a14="http://schemas.microsoft.com/office/drawing/2010/main" val="0"/>
+              </a:ext>
+            </a:extLst>
+          </a:blip>
+          <a:srcRect/>
+          <a:stretch/>
+        </p:blipFill>
+        <p:spPr>
+          <a:xfrm>
+            <a:off x="277745" y="6370378"/>
+            <a:ext cx="2136271" cy="253740"/>
+          </a:xfrm>
+          <a:prstGeom prst="rect">
+            <a:avLst/>
+          </a:prstGeom>
+        </p:spPr>
+      </p:pic>
     </p:spTree>
     <p:extLst>
       <p:ext uri="{BB962C8B-B14F-4D97-AF65-F5344CB8AC3E}">
@@ -2876,409 +2012,7 @@
 </p:sldLayout>
 </file>
 
-<file path=ppt/slideLayouts/slideLayout7.xml><?xml version="1.0" encoding="utf-8"?>
-<p:sldLayout xmlns:a="http://schemas.openxmlformats.org/drawingml/2006/main" xmlns:r="http://schemas.openxmlformats.org/officeDocument/2006/relationships" xmlns:p="http://schemas.openxmlformats.org/presentationml/2006/main" type="twoTxTwoObj" preserve="1">
-  <p:cSld name="比较">
-    <p:spTree>
-      <p:nvGrpSpPr>
-        <p:cNvPr id="1" name=""/>
-        <p:cNvGrpSpPr/>
-        <p:nvPr/>
-      </p:nvGrpSpPr>
-      <p:grpSpPr>
-        <a:xfrm>
-          <a:off x="0" y="0"/>
-          <a:ext cx="0" cy="0"/>
-          <a:chOff x="0" y="0"/>
-          <a:chExt cx="0" cy="0"/>
-        </a:xfrm>
-      </p:grpSpPr>
-      <p:pic>
-        <p:nvPicPr>
-          <p:cNvPr id="10" name="图片 9" descr="内页2">
-            <a:extLst>
-              <a:ext uri="{FF2B5EF4-FFF2-40B4-BE49-F238E27FC236}">
-                <a16:creationId xmlns:a16="http://schemas.microsoft.com/office/drawing/2014/main" id="{D070DDD9-EFC6-59CD-5684-E6BABE9EA9E4}"/>
-              </a:ext>
-            </a:extLst>
-          </p:cNvPr>
-          <p:cNvPicPr>
-            <a:picLocks noChangeAspect="1"/>
-          </p:cNvPicPr>
-          <p:nvPr userDrawn="1"/>
-        </p:nvPicPr>
-        <p:blipFill>
-          <a:blip r:embed="rId7">
-            <a:alphaModFix amt="50000"/>
-          </a:blip>
-          <a:stretch>
-            <a:fillRect/>
-          </a:stretch>
-        </p:blipFill>
-        <p:spPr>
-          <a:xfrm>
-            <a:off x="0" y="0"/>
-            <a:ext cx="12192000" cy="6858000"/>
-          </a:xfrm>
-          <a:prstGeom prst="rect">
-            <a:avLst/>
-          </a:prstGeom>
-        </p:spPr>
-      </p:pic>
-      <p:sp>
-        <p:nvSpPr>
-          <p:cNvPr id="2" name="标题 1"/>
-          <p:cNvSpPr>
-            <a:spLocks noGrp="1"/>
-          </p:cNvSpPr>
-          <p:nvPr>
-            <p:ph type="title"/>
-            <p:custDataLst>
-              <p:tags r:id="rId1"/>
-            </p:custDataLst>
-          </p:nvPr>
-        </p:nvSpPr>
-        <p:spPr>
-          <a:xfrm>
-            <a:off x="608400" y="608400"/>
-            <a:ext cx="10969200" cy="705600"/>
-          </a:xfrm>
-        </p:spPr>
-        <p:txBody>
-          <a:bodyPr vert="horz" lIns="90000" tIns="46800" rIns="90000" bIns="46800" rtlCol="0" anchor="ctr" anchorCtr="0">
-            <a:normAutofit/>
-          </a:bodyPr>
-          <a:lstStyle/>
-          <a:p>
-            <a:pPr lvl="0"/>
-            <a:r>
-              <a:rPr lang="zh-CN" altLang="en-US"/>
-              <a:t>单击此处编辑母版标题样式</a:t>
-            </a:r>
-          </a:p>
-        </p:txBody>
-      </p:sp>
-      <p:sp>
-        <p:nvSpPr>
-          <p:cNvPr id="3" name="文本占位符 2"/>
-          <p:cNvSpPr>
-            <a:spLocks noGrp="1"/>
-          </p:cNvSpPr>
-          <p:nvPr>
-            <p:ph type="body" idx="1" hasCustomPrompt="1"/>
-            <p:custDataLst>
-              <p:tags r:id="rId2"/>
-            </p:custDataLst>
-          </p:nvPr>
-        </p:nvSpPr>
-        <p:spPr>
-          <a:xfrm>
-            <a:off x="608400" y="1429200"/>
-            <a:ext cx="5342400" cy="381600"/>
-          </a:xfrm>
-        </p:spPr>
-        <p:txBody>
-          <a:bodyPr lIns="101600" tIns="38100" rIns="76200" bIns="38100" anchor="t" anchorCtr="0">
-            <a:normAutofit/>
-          </a:bodyPr>
-          <a:lstStyle>
-            <a:lvl1pPr marL="0" indent="0">
-              <a:lnSpc>
-                <a:spcPct val="100000"/>
-              </a:lnSpc>
-              <a:buNone/>
-              <a:defRPr sz="2000" b="1" spc="200">
-                <a:solidFill>
-                  <a:schemeClr val="tx1">
-                    <a:lumMod val="75000"/>
-                    <a:lumOff val="25000"/>
-                  </a:schemeClr>
-                </a:solidFill>
-              </a:defRPr>
-            </a:lvl1pPr>
-            <a:lvl2pPr marL="457200" indent="0">
-              <a:buNone/>
-              <a:defRPr sz="2000" b="1"/>
-            </a:lvl2pPr>
-            <a:lvl3pPr marL="914400" indent="0">
-              <a:buNone/>
-              <a:defRPr sz="1800" b="1"/>
-            </a:lvl3pPr>
-            <a:lvl4pPr marL="1371600" indent="0">
-              <a:buNone/>
-              <a:defRPr sz="1600" b="1"/>
-            </a:lvl4pPr>
-            <a:lvl5pPr marL="1828800" indent="0">
-              <a:buNone/>
-              <a:defRPr sz="1600" b="1"/>
-            </a:lvl5pPr>
-            <a:lvl6pPr marL="2286000" indent="0">
-              <a:buNone/>
-              <a:defRPr sz="1600" b="1"/>
-            </a:lvl6pPr>
-            <a:lvl7pPr marL="2743200" indent="0">
-              <a:buNone/>
-              <a:defRPr sz="1600" b="1"/>
-            </a:lvl7pPr>
-            <a:lvl8pPr marL="3200400" indent="0">
-              <a:buNone/>
-              <a:defRPr sz="1600" b="1"/>
-            </a:lvl8pPr>
-            <a:lvl9pPr marL="3657600" indent="0">
-              <a:buNone/>
-              <a:defRPr sz="1600" b="1"/>
-            </a:lvl9pPr>
-          </a:lstStyle>
-          <a:p>
-            <a:pPr lvl="0"/>
-            <a:r>
-              <a:rPr lang="zh-CN" altLang="en-US" dirty="0"/>
-              <a:t>单击此处编辑文本</a:t>
-            </a:r>
-          </a:p>
-        </p:txBody>
-      </p:sp>
-      <p:sp>
-        <p:nvSpPr>
-          <p:cNvPr id="4" name="内容占位符 3"/>
-          <p:cNvSpPr>
-            <a:spLocks noGrp="1"/>
-          </p:cNvSpPr>
-          <p:nvPr>
-            <p:ph sz="half" idx="2"/>
-            <p:custDataLst>
-              <p:tags r:id="rId3"/>
-            </p:custDataLst>
-          </p:nvPr>
-        </p:nvSpPr>
-        <p:spPr>
-          <a:xfrm>
-            <a:off x="608400" y="1854000"/>
-            <a:ext cx="5342400" cy="4395600"/>
-          </a:xfrm>
-        </p:spPr>
-        <p:txBody>
-          <a:bodyPr vert="horz" lIns="101600" tIns="0" rIns="82550" bIns="0" rtlCol="0">
-            <a:normAutofit/>
-          </a:bodyPr>
-          <a:lstStyle/>
-          <a:p>
-            <a:pPr lvl="0"/>
-            <a:r>
-              <a:rPr lang="zh-CN" altLang="en-US"/>
-              <a:t>单击此处编辑母版文本样式</a:t>
-            </a:r>
-          </a:p>
-          <a:p>
-            <a:pPr lvl="1"/>
-            <a:r>
-              <a:rPr lang="zh-CN" altLang="en-US"/>
-              <a:t>第二级</a:t>
-            </a:r>
-          </a:p>
-          <a:p>
-            <a:pPr lvl="2"/>
-            <a:r>
-              <a:rPr lang="zh-CN" altLang="en-US"/>
-              <a:t>第三级</a:t>
-            </a:r>
-          </a:p>
-          <a:p>
-            <a:pPr lvl="3"/>
-            <a:r>
-              <a:rPr lang="zh-CN" altLang="en-US"/>
-              <a:t>第四级</a:t>
-            </a:r>
-          </a:p>
-          <a:p>
-            <a:pPr lvl="4"/>
-            <a:r>
-              <a:rPr lang="zh-CN" altLang="en-US"/>
-              <a:t>第五级</a:t>
-            </a:r>
-          </a:p>
-        </p:txBody>
-      </p:sp>
-      <p:sp>
-        <p:nvSpPr>
-          <p:cNvPr id="5" name="文本占位符 4"/>
-          <p:cNvSpPr>
-            <a:spLocks noGrp="1"/>
-          </p:cNvSpPr>
-          <p:nvPr>
-            <p:ph type="body" sz="quarter" idx="3" hasCustomPrompt="1"/>
-            <p:custDataLst>
-              <p:tags r:id="rId4"/>
-            </p:custDataLst>
-          </p:nvPr>
-        </p:nvSpPr>
-        <p:spPr>
-          <a:xfrm>
-            <a:off x="6235750" y="1421729"/>
-            <a:ext cx="5342400" cy="381600"/>
-          </a:xfrm>
-        </p:spPr>
-        <p:txBody>
-          <a:bodyPr vert="horz" lIns="101600" tIns="38100" rIns="76200" bIns="38100" rtlCol="0" anchor="t" anchorCtr="0">
-            <a:normAutofit/>
-          </a:bodyPr>
-          <a:lstStyle>
-            <a:lvl1pPr marL="0" indent="0">
-              <a:lnSpc>
-                <a:spcPct val="100000"/>
-              </a:lnSpc>
-              <a:buNone/>
-              <a:defRPr sz="2000" b="1" spc="200">
-                <a:solidFill>
-                  <a:schemeClr val="tx1">
-                    <a:lumMod val="75000"/>
-                    <a:lumOff val="25000"/>
-                  </a:schemeClr>
-                </a:solidFill>
-              </a:defRPr>
-            </a:lvl1pPr>
-            <a:lvl2pPr marL="457200" indent="0">
-              <a:buNone/>
-              <a:defRPr sz="2000" b="1"/>
-            </a:lvl2pPr>
-            <a:lvl3pPr marL="914400" indent="0">
-              <a:buNone/>
-              <a:defRPr sz="1800" b="1"/>
-            </a:lvl3pPr>
-            <a:lvl4pPr marL="1371600" indent="0">
-              <a:buNone/>
-              <a:defRPr sz="1600" b="1"/>
-            </a:lvl4pPr>
-            <a:lvl5pPr marL="1828800" indent="0">
-              <a:buNone/>
-              <a:defRPr sz="1600" b="1"/>
-            </a:lvl5pPr>
-            <a:lvl6pPr marL="2286000" indent="0">
-              <a:buNone/>
-              <a:defRPr sz="1600" b="1"/>
-            </a:lvl6pPr>
-            <a:lvl7pPr marL="2743200" indent="0">
-              <a:buNone/>
-              <a:defRPr sz="1600" b="1"/>
-            </a:lvl7pPr>
-            <a:lvl8pPr marL="3200400" indent="0">
-              <a:buNone/>
-              <a:defRPr sz="1600" b="1"/>
-            </a:lvl8pPr>
-            <a:lvl9pPr marL="3657600" indent="0">
-              <a:buNone/>
-              <a:defRPr sz="1600" b="1"/>
-            </a:lvl9pPr>
-          </a:lstStyle>
-          <a:p>
-            <a:pPr lvl="0"/>
-            <a:r>
-              <a:rPr lang="zh-CN" altLang="en-US"/>
-              <a:t>单击此处编辑文本</a:t>
-            </a:r>
-          </a:p>
-        </p:txBody>
-      </p:sp>
-      <p:sp>
-        <p:nvSpPr>
-          <p:cNvPr id="6" name="内容占位符 5"/>
-          <p:cNvSpPr>
-            <a:spLocks noGrp="1"/>
-          </p:cNvSpPr>
-          <p:nvPr>
-            <p:ph sz="quarter" idx="4"/>
-            <p:custDataLst>
-              <p:tags r:id="rId5"/>
-            </p:custDataLst>
-          </p:nvPr>
-        </p:nvSpPr>
-        <p:spPr>
-          <a:xfrm>
-            <a:off x="6235750" y="1854000"/>
-            <a:ext cx="5342400" cy="4395600"/>
-          </a:xfrm>
-        </p:spPr>
-        <p:txBody>
-          <a:bodyPr vert="horz" lIns="101600" tIns="0" rIns="82550" bIns="0" rtlCol="0">
-            <a:normAutofit/>
-          </a:bodyPr>
-          <a:lstStyle/>
-          <a:p>
-            <a:pPr lvl="0"/>
-            <a:r>
-              <a:rPr lang="zh-CN" altLang="en-US"/>
-              <a:t>单击此处编辑母版文本样式</a:t>
-            </a:r>
-          </a:p>
-          <a:p>
-            <a:pPr lvl="1"/>
-            <a:r>
-              <a:rPr lang="zh-CN" altLang="en-US"/>
-              <a:t>第二级</a:t>
-            </a:r>
-          </a:p>
-          <a:p>
-            <a:pPr lvl="2"/>
-            <a:r>
-              <a:rPr lang="zh-CN" altLang="en-US"/>
-              <a:t>第三级</a:t>
-            </a:r>
-          </a:p>
-          <a:p>
-            <a:pPr lvl="3"/>
-            <a:r>
-              <a:rPr lang="zh-CN" altLang="en-US"/>
-              <a:t>第四级</a:t>
-            </a:r>
-          </a:p>
-          <a:p>
-            <a:pPr lvl="4"/>
-            <a:r>
-              <a:rPr lang="zh-CN" altLang="en-US"/>
-              <a:t>第五级</a:t>
-            </a:r>
-          </a:p>
-        </p:txBody>
-      </p:sp>
-      <p:pic>
-        <p:nvPicPr>
-          <p:cNvPr id="11" name="图片 10" descr="logo">
-            <a:extLst>
-              <a:ext uri="{FF2B5EF4-FFF2-40B4-BE49-F238E27FC236}">
-                <a16:creationId xmlns:a16="http://schemas.microsoft.com/office/drawing/2014/main" id="{95AFA96D-04CD-20BD-77C3-724240996807}"/>
-              </a:ext>
-            </a:extLst>
-          </p:cNvPr>
-          <p:cNvPicPr>
-            <a:picLocks noChangeAspect="1"/>
-          </p:cNvPicPr>
-          <p:nvPr userDrawn="1"/>
-        </p:nvPicPr>
-        <p:blipFill>
-          <a:blip r:embed="rId8"/>
-          <a:stretch>
-            <a:fillRect/>
-          </a:stretch>
-        </p:blipFill>
-        <p:spPr>
-          <a:xfrm>
-            <a:off x="10333495" y="422275"/>
-            <a:ext cx="1551305" cy="474345"/>
-          </a:xfrm>
-          <a:prstGeom prst="rect">
-            <a:avLst/>
-          </a:prstGeom>
-        </p:spPr>
-      </p:pic>
-    </p:spTree>
-  </p:cSld>
-  <p:clrMapOvr>
-    <a:masterClrMapping/>
-  </p:clrMapOvr>
-</p:sldLayout>
-</file>
-
-<file path=ppt/slideLayouts/slideLayout8.xml><?xml version="1.0" encoding="utf-8"?>
+<file path=ppt/slideLayouts/slideLayout6.xml><?xml version="1.0" encoding="utf-8"?>
 <p:sldLayout xmlns:a="http://schemas.openxmlformats.org/drawingml/2006/main" xmlns:r="http://schemas.openxmlformats.org/officeDocument/2006/relationships" xmlns:p="http://schemas.openxmlformats.org/presentationml/2006/main" preserve="1" userDrawn="1">
   <p:cSld name="1_两栏内容">
     <p:spTree>
@@ -3508,6 +2242,41 @@
           </a:p>
         </p:txBody>
       </p:sp>
+      <p:pic>
+        <p:nvPicPr>
+          <p:cNvPr id="2" name="图片 1">
+            <a:extLst>
+              <a:ext uri="{FF2B5EF4-FFF2-40B4-BE49-F238E27FC236}">
+                <a16:creationId xmlns:a16="http://schemas.microsoft.com/office/drawing/2014/main" id="{A966E3F3-6B7F-9F1D-B18A-7D74CFA1F3C4}"/>
+              </a:ext>
+            </a:extLst>
+          </p:cNvPr>
+          <p:cNvPicPr>
+            <a:picLocks noChangeAspect="1"/>
+          </p:cNvPicPr>
+          <p:nvPr userDrawn="1"/>
+        </p:nvPicPr>
+        <p:blipFill>
+          <a:blip r:embed="rId6" cstate="print">
+            <a:extLst>
+              <a:ext uri="{28A0092B-C50C-407E-A947-70E740481C1C}">
+                <a14:useLocalDpi xmlns:a14="http://schemas.microsoft.com/office/drawing/2010/main" val="0"/>
+              </a:ext>
+            </a:extLst>
+          </a:blip>
+          <a:srcRect/>
+          <a:stretch/>
+        </p:blipFill>
+        <p:spPr>
+          <a:xfrm>
+            <a:off x="277745" y="6370378"/>
+            <a:ext cx="2136271" cy="253740"/>
+          </a:xfrm>
+          <a:prstGeom prst="rect">
+            <a:avLst/>
+          </a:prstGeom>
+        </p:spPr>
+      </p:pic>
     </p:spTree>
     <p:extLst>
       <p:ext uri="{BB962C8B-B14F-4D97-AF65-F5344CB8AC3E}">
@@ -3521,9 +2290,9 @@
 </p:sldLayout>
 </file>
 
-<file path=ppt/slideLayouts/slideLayout9.xml><?xml version="1.0" encoding="utf-8"?>
-<p:sldLayout xmlns:a="http://schemas.openxmlformats.org/drawingml/2006/main" xmlns:r="http://schemas.openxmlformats.org/officeDocument/2006/relationships" xmlns:p="http://schemas.openxmlformats.org/presentationml/2006/main" type="twoObj" preserve="1">
-  <p:cSld name="两栏内容">
+<file path=ppt/slideLayouts/slideLayout7.xml><?xml version="1.0" encoding="utf-8"?>
+<p:sldLayout xmlns:a="http://schemas.openxmlformats.org/drawingml/2006/main" xmlns:r="http://schemas.openxmlformats.org/officeDocument/2006/relationships" xmlns:p="http://schemas.openxmlformats.org/presentationml/2006/main" preserve="1" userDrawn="1">
+  <p:cSld name="1_图片与标题">
     <p:spTree>
       <p:nvGrpSpPr>
         <p:cNvPr id="1" name=""/>
@@ -3540,10 +2309,10 @@
       </p:grpSpPr>
       <p:pic>
         <p:nvPicPr>
-          <p:cNvPr id="8" name="图片 7" descr="内页2">
-            <a:extLst>
-              <a:ext uri="{FF2B5EF4-FFF2-40B4-BE49-F238E27FC236}">
-                <a16:creationId xmlns:a16="http://schemas.microsoft.com/office/drawing/2014/main" id="{F537FD2A-4AEC-1852-C947-0D3A40AAAE0B}"/>
+          <p:cNvPr id="6" name="图片 5" descr="内页">
+            <a:extLst>
+              <a:ext uri="{FF2B5EF4-FFF2-40B4-BE49-F238E27FC236}">
+                <a16:creationId xmlns:a16="http://schemas.microsoft.com/office/drawing/2014/main" id="{F4CFDD88-9400-69BE-CAD1-052DACEE71A9}"/>
               </a:ext>
             </a:extLst>
           </p:cNvPr>
@@ -3553,12 +2322,11 @@
           <p:nvPr userDrawn="1"/>
         </p:nvPicPr>
         <p:blipFill>
-          <a:blip r:embed="rId5">
-            <a:alphaModFix amt="35000"/>
+          <a:blip r:embed="rId4">
+            <a:alphaModFix amt="70000"/>
           </a:blip>
-          <a:stretch>
-            <a:fillRect/>
-          </a:stretch>
+          <a:srcRect/>
+          <a:stretch/>
         </p:blipFill>
         <p:spPr>
           <a:xfrm>
@@ -3572,12 +2340,12 @@
       </p:pic>
       <p:sp>
         <p:nvSpPr>
-          <p:cNvPr id="2" name="标题 1"/>
+          <p:cNvPr id="3" name="图片占位符 2"/>
           <p:cNvSpPr>
             <a:spLocks noGrp="1"/>
           </p:cNvSpPr>
           <p:nvPr>
-            <p:ph type="title"/>
+            <p:ph type="pic" idx="1"/>
             <p:custDataLst>
               <p:tags r:id="rId1"/>
             </p:custDataLst>
@@ -3585,32 +2353,34 @@
         </p:nvSpPr>
         <p:spPr>
           <a:xfrm>
-            <a:off x="608400" y="608400"/>
-            <a:ext cx="10969200" cy="705600"/>
+            <a:off x="608400" y="1338030"/>
+            <a:ext cx="5233077" cy="4324392"/>
           </a:xfrm>
         </p:spPr>
         <p:txBody>
-          <a:bodyPr vert="horz" lIns="90000" tIns="46800" rIns="90000" bIns="46800" rtlCol="0" anchor="ctr" anchorCtr="0">
+          <a:bodyPr vert="horz" lIns="90000" tIns="46800" rIns="90000" bIns="46800" rtlCol="0">
             <a:normAutofit/>
           </a:bodyPr>
-          <a:lstStyle/>
+          <a:lstStyle>
+            <a:lvl1pPr>
+              <a:buNone/>
+              <a:defRPr sz="1600"/>
+            </a:lvl1pPr>
+          </a:lstStyle>
           <a:p>
             <a:pPr lvl="0"/>
-            <a:r>
-              <a:rPr lang="zh-CN" altLang="en-US"/>
-              <a:t>单击此处编辑母版标题样式</a:t>
-            </a:r>
+            <a:endParaRPr lang="zh-CN" altLang="en-US"/>
           </a:p>
         </p:txBody>
       </p:sp>
       <p:sp>
         <p:nvSpPr>
-          <p:cNvPr id="3" name="内容占位符 2"/>
+          <p:cNvPr id="4" name="文本占位符 3"/>
           <p:cNvSpPr>
             <a:spLocks noGrp="1"/>
           </p:cNvSpPr>
           <p:nvPr>
-            <p:ph sz="half" idx="1"/>
+            <p:ph type="body" sz="half" idx="2"/>
             <p:custDataLst>
               <p:tags r:id="rId2"/>
             </p:custDataLst>
@@ -3618,15 +2388,20 @@
         </p:nvSpPr>
         <p:spPr>
           <a:xfrm>
-            <a:off x="608400" y="1501200"/>
-            <a:ext cx="5176800" cy="4748400"/>
+            <a:off x="6350400" y="1338030"/>
+            <a:ext cx="5227200" cy="4324392"/>
           </a:xfrm>
         </p:spPr>
         <p:txBody>
           <a:bodyPr vert="horz" lIns="90000" tIns="46800" rIns="90000" bIns="46800" rtlCol="0">
             <a:normAutofit/>
           </a:bodyPr>
-          <a:lstStyle/>
+          <a:lstStyle>
+            <a:lvl1pPr>
+              <a:buNone/>
+              <a:defRPr sz="1600"/>
+            </a:lvl1pPr>
+          </a:lstStyle>
           <a:p>
             <a:pPr lvl="0"/>
             <a:r>
@@ -3634,103 +2409,14 @@
               <a:t>单击此处编辑母版文本样式</a:t>
             </a:r>
           </a:p>
-          <a:p>
-            <a:pPr lvl="1"/>
-            <a:r>
-              <a:rPr lang="zh-CN" altLang="en-US"/>
-              <a:t>第二级</a:t>
-            </a:r>
-          </a:p>
-          <a:p>
-            <a:pPr lvl="2"/>
-            <a:r>
-              <a:rPr lang="zh-CN" altLang="en-US"/>
-              <a:t>第三级</a:t>
-            </a:r>
-          </a:p>
-          <a:p>
-            <a:pPr lvl="3"/>
-            <a:r>
-              <a:rPr lang="zh-CN" altLang="en-US"/>
-              <a:t>第四级</a:t>
-            </a:r>
-          </a:p>
-          <a:p>
-            <a:pPr lvl="4"/>
-            <a:r>
-              <a:rPr lang="zh-CN" altLang="en-US"/>
-              <a:t>第五级</a:t>
-            </a:r>
-          </a:p>
-        </p:txBody>
-      </p:sp>
-      <p:sp>
-        <p:nvSpPr>
-          <p:cNvPr id="4" name="内容占位符 3"/>
-          <p:cNvSpPr>
-            <a:spLocks noGrp="1"/>
-          </p:cNvSpPr>
-          <p:nvPr>
-            <p:ph sz="half" idx="2"/>
-            <p:custDataLst>
-              <p:tags r:id="rId3"/>
-            </p:custDataLst>
-          </p:nvPr>
-        </p:nvSpPr>
-        <p:spPr>
-          <a:xfrm>
-            <a:off x="6411600" y="1501200"/>
-            <a:ext cx="5176800" cy="4748400"/>
-          </a:xfrm>
-        </p:spPr>
-        <p:txBody>
-          <a:bodyPr lIns="90000" tIns="46800" rIns="90000" bIns="46800">
-            <a:normAutofit/>
-          </a:bodyPr>
-          <a:lstStyle/>
-          <a:p>
-            <a:pPr lvl="0"/>
-            <a:r>
-              <a:rPr lang="zh-CN" altLang="en-US" dirty="0"/>
-              <a:t>单击此处编辑母版文本样式</a:t>
-            </a:r>
-          </a:p>
-          <a:p>
-            <a:pPr lvl="1"/>
-            <a:r>
-              <a:rPr lang="zh-CN" altLang="en-US" dirty="0"/>
-              <a:t>第二级</a:t>
-            </a:r>
-          </a:p>
-          <a:p>
-            <a:pPr lvl="2"/>
-            <a:r>
-              <a:rPr lang="zh-CN" altLang="en-US" dirty="0"/>
-              <a:t>第三级</a:t>
-            </a:r>
-          </a:p>
-          <a:p>
-            <a:pPr lvl="3"/>
-            <a:r>
-              <a:rPr lang="zh-CN" altLang="en-US" dirty="0"/>
-              <a:t>第四级</a:t>
-            </a:r>
-          </a:p>
-          <a:p>
-            <a:pPr lvl="4"/>
-            <a:r>
-              <a:rPr lang="zh-CN" altLang="en-US" dirty="0"/>
-              <a:t>第五级</a:t>
-            </a:r>
-          </a:p>
         </p:txBody>
       </p:sp>
       <p:pic>
         <p:nvPicPr>
-          <p:cNvPr id="9" name="图片 8" descr="logo">
-            <a:extLst>
-              <a:ext uri="{FF2B5EF4-FFF2-40B4-BE49-F238E27FC236}">
-                <a16:creationId xmlns:a16="http://schemas.microsoft.com/office/drawing/2014/main" id="{53F02CFD-872F-B27A-26E4-E4C319E93ED5}"/>
+          <p:cNvPr id="7" name="图片 6" descr="logo">
+            <a:extLst>
+              <a:ext uri="{FF2B5EF4-FFF2-40B4-BE49-F238E27FC236}">
+                <a16:creationId xmlns:a16="http://schemas.microsoft.com/office/drawing/2014/main" id="{BE448B85-99E5-BB52-36B3-A57B3A91BE43}"/>
               </a:ext>
             </a:extLst>
           </p:cNvPr>
@@ -3740,7 +2426,7 @@
           <p:nvPr userDrawn="1"/>
         </p:nvPicPr>
         <p:blipFill>
-          <a:blip r:embed="rId6"/>
+          <a:blip r:embed="rId5"/>
           <a:stretch>
             <a:fillRect/>
           </a:stretch>
@@ -3749,6 +2435,353 @@
           <a:xfrm>
             <a:off x="10333495" y="422275"/>
             <a:ext cx="1551305" cy="474345"/>
+          </a:xfrm>
+          <a:prstGeom prst="rect">
+            <a:avLst/>
+          </a:prstGeom>
+        </p:spPr>
+      </p:pic>
+      <p:sp>
+        <p:nvSpPr>
+          <p:cNvPr id="8" name="标题 1">
+            <a:extLst>
+              <a:ext uri="{FF2B5EF4-FFF2-40B4-BE49-F238E27FC236}">
+                <a16:creationId xmlns:a16="http://schemas.microsoft.com/office/drawing/2014/main" id="{0A531B37-8C55-7A4C-BAB1-E5F033E0249E}"/>
+              </a:ext>
+            </a:extLst>
+          </p:cNvPr>
+          <p:cNvSpPr>
+            <a:spLocks noGrp="1"/>
+          </p:cNvSpPr>
+          <p:nvPr>
+            <p:ph type="title"/>
+          </p:nvPr>
+        </p:nvSpPr>
+        <p:spPr>
+          <a:xfrm>
+            <a:off x="608400" y="288360"/>
+            <a:ext cx="10969200" cy="705600"/>
+          </a:xfrm>
+        </p:spPr>
+        <p:txBody>
+          <a:bodyPr/>
+          <a:lstStyle/>
+          <a:p>
+            <a:endParaRPr lang="zh-CN" altLang="en-US" dirty="0"/>
+          </a:p>
+        </p:txBody>
+      </p:sp>
+      <p:pic>
+        <p:nvPicPr>
+          <p:cNvPr id="2" name="图片 1">
+            <a:extLst>
+              <a:ext uri="{FF2B5EF4-FFF2-40B4-BE49-F238E27FC236}">
+                <a16:creationId xmlns:a16="http://schemas.microsoft.com/office/drawing/2014/main" id="{50ECB845-99FC-2CA6-2AAE-B7B0E9A9251C}"/>
+              </a:ext>
+            </a:extLst>
+          </p:cNvPr>
+          <p:cNvPicPr>
+            <a:picLocks noChangeAspect="1"/>
+          </p:cNvPicPr>
+          <p:nvPr userDrawn="1"/>
+        </p:nvPicPr>
+        <p:blipFill>
+          <a:blip r:embed="rId6" cstate="print">
+            <a:extLst>
+              <a:ext uri="{28A0092B-C50C-407E-A947-70E740481C1C}">
+                <a14:useLocalDpi xmlns:a14="http://schemas.microsoft.com/office/drawing/2010/main" val="0"/>
+              </a:ext>
+            </a:extLst>
+          </a:blip>
+          <a:srcRect/>
+          <a:stretch/>
+        </p:blipFill>
+        <p:spPr>
+          <a:xfrm>
+            <a:off x="277745" y="6370378"/>
+            <a:ext cx="2136271" cy="253740"/>
+          </a:xfrm>
+          <a:prstGeom prst="rect">
+            <a:avLst/>
+          </a:prstGeom>
+        </p:spPr>
+      </p:pic>
+    </p:spTree>
+    <p:extLst>
+      <p:ext uri="{BB962C8B-B14F-4D97-AF65-F5344CB8AC3E}">
+        <p14:creationId xmlns:p14="http://schemas.microsoft.com/office/powerpoint/2010/main" val="1890353880"/>
+      </p:ext>
+    </p:extLst>
+  </p:cSld>
+  <p:clrMapOvr>
+    <a:masterClrMapping/>
+  </p:clrMapOvr>
+</p:sldLayout>
+</file>
+
+<file path=ppt/slideLayouts/slideLayout8.xml><?xml version="1.0" encoding="utf-8"?>
+<p:sldLayout xmlns:a="http://schemas.openxmlformats.org/drawingml/2006/main" xmlns:r="http://schemas.openxmlformats.org/officeDocument/2006/relationships" xmlns:p="http://schemas.openxmlformats.org/presentationml/2006/main" preserve="1" userDrawn="1">
+  <p:cSld name="1_仅标题">
+    <p:spTree>
+      <p:nvGrpSpPr>
+        <p:cNvPr id="1" name=""/>
+        <p:cNvGrpSpPr/>
+        <p:nvPr/>
+      </p:nvGrpSpPr>
+      <p:grpSpPr>
+        <a:xfrm>
+          <a:off x="0" y="0"/>
+          <a:ext cx="0" cy="0"/>
+          <a:chOff x="0" y="0"/>
+          <a:chExt cx="0" cy="0"/>
+        </a:xfrm>
+      </p:grpSpPr>
+      <p:pic>
+        <p:nvPicPr>
+          <p:cNvPr id="8" name="图片 7" descr="内页">
+            <a:extLst>
+              <a:ext uri="{FF2B5EF4-FFF2-40B4-BE49-F238E27FC236}">
+                <a16:creationId xmlns:a16="http://schemas.microsoft.com/office/drawing/2014/main" id="{946D447C-3ABE-4E84-C411-767D231F9DE6}"/>
+              </a:ext>
+            </a:extLst>
+          </p:cNvPr>
+          <p:cNvPicPr>
+            <a:picLocks noChangeAspect="1"/>
+          </p:cNvPicPr>
+          <p:nvPr userDrawn="1"/>
+        </p:nvPicPr>
+        <p:blipFill>
+          <a:blip r:embed="rId2">
+            <a:alphaModFix amt="70000"/>
+          </a:blip>
+          <a:srcRect/>
+          <a:stretch/>
+        </p:blipFill>
+        <p:spPr>
+          <a:xfrm>
+            <a:off x="0" y="0"/>
+            <a:ext cx="12192000" cy="6858000"/>
+          </a:xfrm>
+          <a:prstGeom prst="rect">
+            <a:avLst/>
+          </a:prstGeom>
+        </p:spPr>
+      </p:pic>
+      <p:pic>
+        <p:nvPicPr>
+          <p:cNvPr id="7" name="图片 6" descr="logo">
+            <a:extLst>
+              <a:ext uri="{FF2B5EF4-FFF2-40B4-BE49-F238E27FC236}">
+                <a16:creationId xmlns:a16="http://schemas.microsoft.com/office/drawing/2014/main" id="{B33223AF-920E-B0E1-9FD6-5A68D1745694}"/>
+              </a:ext>
+            </a:extLst>
+          </p:cNvPr>
+          <p:cNvPicPr>
+            <a:picLocks noChangeAspect="1"/>
+          </p:cNvPicPr>
+          <p:nvPr userDrawn="1"/>
+        </p:nvPicPr>
+        <p:blipFill>
+          <a:blip r:embed="rId3"/>
+          <a:stretch>
+            <a:fillRect/>
+          </a:stretch>
+        </p:blipFill>
+        <p:spPr>
+          <a:xfrm>
+            <a:off x="10333495" y="422275"/>
+            <a:ext cx="1551305" cy="474345"/>
+          </a:xfrm>
+          <a:prstGeom prst="rect">
+            <a:avLst/>
+          </a:prstGeom>
+        </p:spPr>
+      </p:pic>
+      <p:sp>
+        <p:nvSpPr>
+          <p:cNvPr id="5" name="标题 1">
+            <a:extLst>
+              <a:ext uri="{FF2B5EF4-FFF2-40B4-BE49-F238E27FC236}">
+                <a16:creationId xmlns:a16="http://schemas.microsoft.com/office/drawing/2014/main" id="{89C71938-62F0-5B4A-B5D5-453857A58202}"/>
+              </a:ext>
+            </a:extLst>
+          </p:cNvPr>
+          <p:cNvSpPr>
+            <a:spLocks noGrp="1"/>
+          </p:cNvSpPr>
+          <p:nvPr>
+            <p:ph type="title"/>
+          </p:nvPr>
+        </p:nvSpPr>
+        <p:spPr>
+          <a:xfrm>
+            <a:off x="608400" y="288360"/>
+            <a:ext cx="10969200" cy="705600"/>
+          </a:xfrm>
+        </p:spPr>
+        <p:txBody>
+          <a:bodyPr/>
+          <a:lstStyle/>
+          <a:p>
+            <a:endParaRPr lang="zh-CN" altLang="en-US" dirty="0"/>
+          </a:p>
+        </p:txBody>
+      </p:sp>
+      <p:pic>
+        <p:nvPicPr>
+          <p:cNvPr id="2" name="图片 1">
+            <a:extLst>
+              <a:ext uri="{FF2B5EF4-FFF2-40B4-BE49-F238E27FC236}">
+                <a16:creationId xmlns:a16="http://schemas.microsoft.com/office/drawing/2014/main" id="{BC404DAC-24DB-19D7-A9AA-26DBA3FC08CC}"/>
+              </a:ext>
+            </a:extLst>
+          </p:cNvPr>
+          <p:cNvPicPr>
+            <a:picLocks noChangeAspect="1"/>
+          </p:cNvPicPr>
+          <p:nvPr userDrawn="1"/>
+        </p:nvPicPr>
+        <p:blipFill>
+          <a:blip r:embed="rId4" cstate="print">
+            <a:extLst>
+              <a:ext uri="{28A0092B-C50C-407E-A947-70E740481C1C}">
+                <a14:useLocalDpi xmlns:a14="http://schemas.microsoft.com/office/drawing/2010/main" val="0"/>
+              </a:ext>
+            </a:extLst>
+          </a:blip>
+          <a:srcRect/>
+          <a:stretch/>
+        </p:blipFill>
+        <p:spPr>
+          <a:xfrm>
+            <a:off x="277745" y="6370378"/>
+            <a:ext cx="2136271" cy="253740"/>
+          </a:xfrm>
+          <a:prstGeom prst="rect">
+            <a:avLst/>
+          </a:prstGeom>
+        </p:spPr>
+      </p:pic>
+    </p:spTree>
+    <p:extLst>
+      <p:ext uri="{BB962C8B-B14F-4D97-AF65-F5344CB8AC3E}">
+        <p14:creationId xmlns:p14="http://schemas.microsoft.com/office/powerpoint/2010/main" val="2281842546"/>
+      </p:ext>
+    </p:extLst>
+  </p:cSld>
+  <p:clrMapOvr>
+    <a:masterClrMapping/>
+  </p:clrMapOvr>
+</p:sldLayout>
+</file>
+
+<file path=ppt/slideLayouts/slideLayout9.xml><?xml version="1.0" encoding="utf-8"?>
+<p:sldLayout xmlns:a="http://schemas.openxmlformats.org/drawingml/2006/main" xmlns:r="http://schemas.openxmlformats.org/officeDocument/2006/relationships" xmlns:p="http://schemas.openxmlformats.org/presentationml/2006/main" type="blank" preserve="1">
+  <p:cSld name="空白">
+    <p:spTree>
+      <p:nvGrpSpPr>
+        <p:cNvPr id="1" name=""/>
+        <p:cNvGrpSpPr/>
+        <p:nvPr/>
+      </p:nvGrpSpPr>
+      <p:grpSpPr>
+        <a:xfrm>
+          <a:off x="0" y="0"/>
+          <a:ext cx="0" cy="0"/>
+          <a:chOff x="0" y="0"/>
+          <a:chExt cx="0" cy="0"/>
+        </a:xfrm>
+      </p:grpSpPr>
+      <p:pic>
+        <p:nvPicPr>
+          <p:cNvPr id="6" name="图片 5" descr="内页">
+            <a:extLst>
+              <a:ext uri="{FF2B5EF4-FFF2-40B4-BE49-F238E27FC236}">
+                <a16:creationId xmlns:a16="http://schemas.microsoft.com/office/drawing/2014/main" id="{FDD1047B-D210-7E43-40DF-E4C3E15C5120}"/>
+              </a:ext>
+            </a:extLst>
+          </p:cNvPr>
+          <p:cNvPicPr>
+            <a:picLocks noChangeAspect="1"/>
+          </p:cNvPicPr>
+          <p:nvPr userDrawn="1"/>
+        </p:nvPicPr>
+        <p:blipFill>
+          <a:blip r:embed="rId2">
+            <a:alphaModFix amt="70000"/>
+          </a:blip>
+          <a:srcRect/>
+          <a:stretch/>
+        </p:blipFill>
+        <p:spPr>
+          <a:xfrm>
+            <a:off x="0" y="0"/>
+            <a:ext cx="12192000" cy="6858000"/>
+          </a:xfrm>
+          <a:prstGeom prst="rect">
+            <a:avLst/>
+          </a:prstGeom>
+        </p:spPr>
+      </p:pic>
+      <p:pic>
+        <p:nvPicPr>
+          <p:cNvPr id="5" name="图片 4" descr="logo">
+            <a:extLst>
+              <a:ext uri="{FF2B5EF4-FFF2-40B4-BE49-F238E27FC236}">
+                <a16:creationId xmlns:a16="http://schemas.microsoft.com/office/drawing/2014/main" id="{60A5301D-39E6-79B6-2F25-CD263BDAAD15}"/>
+              </a:ext>
+            </a:extLst>
+          </p:cNvPr>
+          <p:cNvPicPr>
+            <a:picLocks noChangeAspect="1"/>
+          </p:cNvPicPr>
+          <p:nvPr userDrawn="1"/>
+        </p:nvPicPr>
+        <p:blipFill>
+          <a:blip r:embed="rId3"/>
+          <a:stretch>
+            <a:fillRect/>
+          </a:stretch>
+        </p:blipFill>
+        <p:spPr>
+          <a:xfrm>
+            <a:off x="10333495" y="422275"/>
+            <a:ext cx="1551305" cy="474345"/>
+          </a:xfrm>
+          <a:prstGeom prst="rect">
+            <a:avLst/>
+          </a:prstGeom>
+        </p:spPr>
+      </p:pic>
+      <p:pic>
+        <p:nvPicPr>
+          <p:cNvPr id="2" name="图片 1">
+            <a:extLst>
+              <a:ext uri="{FF2B5EF4-FFF2-40B4-BE49-F238E27FC236}">
+                <a16:creationId xmlns:a16="http://schemas.microsoft.com/office/drawing/2014/main" id="{A5AC68E1-6EA6-7E52-643D-D949546ED7CC}"/>
+              </a:ext>
+            </a:extLst>
+          </p:cNvPr>
+          <p:cNvPicPr>
+            <a:picLocks noChangeAspect="1"/>
+          </p:cNvPicPr>
+          <p:nvPr userDrawn="1"/>
+        </p:nvPicPr>
+        <p:blipFill>
+          <a:blip r:embed="rId4" cstate="print">
+            <a:extLst>
+              <a:ext uri="{28A0092B-C50C-407E-A947-70E740481C1C}">
+                <a14:useLocalDpi xmlns:a14="http://schemas.microsoft.com/office/drawing/2010/main" val="0"/>
+              </a:ext>
+            </a:extLst>
+          </a:blip>
+          <a:srcRect/>
+          <a:stretch/>
+        </p:blipFill>
+        <p:spPr>
+          <a:xfrm>
+            <a:off x="277745" y="6370378"/>
+            <a:ext cx="2136271" cy="253740"/>
           </a:xfrm>
           <a:prstGeom prst="rect">
             <a:avLst/>
@@ -3794,7 +2827,7 @@
           <p:nvPr>
             <p:ph type="title"/>
             <p:custDataLst>
-              <p:tags r:id="rId21"/>
+              <p:tags r:id="rId14"/>
             </p:custDataLst>
           </p:nvPr>
         </p:nvSpPr>
@@ -3829,7 +2862,7 @@
           <p:nvPr>
             <p:ph type="body" idx="1"/>
             <p:custDataLst>
-              <p:tags r:id="rId22"/>
+              <p:tags r:id="rId15"/>
             </p:custDataLst>
           </p:nvPr>
         </p:nvSpPr>
@@ -3893,7 +2926,7 @@
           <p:nvPr>
             <p:ph type="dt" sz="half" idx="2"/>
             <p:custDataLst>
-              <p:tags r:id="rId23"/>
+              <p:tags r:id="rId16"/>
             </p:custDataLst>
           </p:nvPr>
         </p:nvSpPr>
@@ -3924,7 +2957,7 @@
           <a:p>
             <a:fld id="{760FBDFE-C587-4B4C-A407-44438C67B59E}" type="datetimeFigureOut">
               <a:rPr lang="zh-CN" altLang="en-US" smtClean="0"/>
-              <a:t>2024/9/3</a:t>
+              <a:t>2024/9/17</a:t>
             </a:fld>
             <a:endParaRPr lang="zh-CN" altLang="en-US"/>
           </a:p>
@@ -3939,7 +2972,7 @@
           <p:nvPr>
             <p:ph type="ftr" sz="quarter" idx="3"/>
             <p:custDataLst>
-              <p:tags r:id="rId24"/>
+              <p:tags r:id="rId17"/>
             </p:custDataLst>
           </p:nvPr>
         </p:nvSpPr>
@@ -3981,7 +3014,7 @@
           <p:nvPr>
             <p:ph type="sldNum" sz="quarter" idx="4"/>
             <p:custDataLst>
-              <p:tags r:id="rId25"/>
+              <p:tags r:id="rId18"/>
             </p:custDataLst>
           </p:nvPr>
         </p:nvSpPr>
@@ -4020,29 +3053,22 @@
       </p:sp>
     </p:spTree>
     <p:custDataLst>
-      <p:tags r:id="rId20"/>
+      <p:tags r:id="rId13"/>
     </p:custDataLst>
   </p:cSld>
   <p:clrMap bg1="lt1" tx1="dk1" bg2="lt2" tx2="dk2" accent1="accent1" accent2="accent2" accent3="accent3" accent4="accent4" accent5="accent5" accent6="accent6" hlink="hlink" folHlink="folHlink"/>
   <p:sldLayoutIdLst>
     <p:sldLayoutId id="2147483649" r:id="rId1"/>
     <p:sldLayoutId id="2147483667" r:id="rId2"/>
-    <p:sldLayoutId id="2147483650" r:id="rId3"/>
-    <p:sldLayoutId id="2147483660" r:id="rId4"/>
-    <p:sldLayoutId id="2147483651" r:id="rId5"/>
-    <p:sldLayoutId id="2147483661" r:id="rId6"/>
-    <p:sldLayoutId id="2147483653" r:id="rId7"/>
-    <p:sldLayoutId id="2147483662" r:id="rId8"/>
-    <p:sldLayoutId id="2147483652" r:id="rId9"/>
-    <p:sldLayoutId id="2147483663" r:id="rId10"/>
-    <p:sldLayoutId id="2147483656" r:id="rId11"/>
-    <p:sldLayoutId id="2147483664" r:id="rId12"/>
-    <p:sldLayoutId id="2147483654" r:id="rId13"/>
-    <p:sldLayoutId id="2147483655" r:id="rId14"/>
-    <p:sldLayoutId id="2147483665" r:id="rId15"/>
-    <p:sldLayoutId id="2147483666" r:id="rId16"/>
-    <p:sldLayoutId id="2147483658" r:id="rId17"/>
-    <p:sldLayoutId id="2147483659" r:id="rId18"/>
+    <p:sldLayoutId id="2147483651" r:id="rId3"/>
+    <p:sldLayoutId id="2147483650" r:id="rId4"/>
+    <p:sldLayoutId id="2147483661" r:id="rId5"/>
+    <p:sldLayoutId id="2147483662" r:id="rId6"/>
+    <p:sldLayoutId id="2147483663" r:id="rId7"/>
+    <p:sldLayoutId id="2147483664" r:id="rId8"/>
+    <p:sldLayoutId id="2147483655" r:id="rId9"/>
+    <p:sldLayoutId id="2147483666" r:id="rId10"/>
+    <p:sldLayoutId id="2147483659" r:id="rId11"/>
   </p:sldLayoutIdLst>
   <p:txStyles>
     <p:titleStyle>
@@ -4471,10 +3497,10 @@
       </p:grpSpPr>
       <p:sp>
         <p:nvSpPr>
-          <p:cNvPr id="2" name="文本占位符 1">
-            <a:extLst>
-              <a:ext uri="{FF2B5EF4-FFF2-40B4-BE49-F238E27FC236}">
-                <a16:creationId xmlns:a16="http://schemas.microsoft.com/office/drawing/2014/main" id="{E4981B45-EBBA-D07E-CC08-7ACF16CBC7A0}"/>
+          <p:cNvPr id="2" name="标题 1">
+            <a:extLst>
+              <a:ext uri="{FF2B5EF4-FFF2-40B4-BE49-F238E27FC236}">
+                <a16:creationId xmlns:a16="http://schemas.microsoft.com/office/drawing/2014/main" id="{849E96E3-F409-E008-B877-7B11495ADA9B}"/>
               </a:ext>
             </a:extLst>
           </p:cNvPr>
@@ -4482,7 +3508,7 @@
             <a:spLocks noGrp="1"/>
           </p:cNvSpPr>
           <p:nvPr>
-            <p:ph type="body" sz="quarter" idx="10"/>
+            <p:ph type="title"/>
           </p:nvPr>
         </p:nvSpPr>
         <p:spPr/>
@@ -4490,62 +3516,39 @@
           <a:bodyPr/>
           <a:lstStyle/>
           <a:p>
-            <a:pPr>
-              <a:buSzPct val="120000"/>
-            </a:pPr>
-            <a:endParaRPr lang="en-US" altLang="zh-CN" dirty="0"/>
+            <a:endParaRPr lang="zh-CN" altLang="en-US" dirty="0"/>
           </a:p>
         </p:txBody>
       </p:sp>
       <p:sp>
         <p:nvSpPr>
-          <p:cNvPr id="3" name="文本框 2">
-            <a:extLst>
-              <a:ext uri="{FF2B5EF4-FFF2-40B4-BE49-F238E27FC236}">
-                <a16:creationId xmlns:a16="http://schemas.microsoft.com/office/drawing/2014/main" id="{F71EF3D0-261D-963A-851A-604F0FBF2F91}"/>
-              </a:ext>
-            </a:extLst>
-          </p:cNvPr>
-          <p:cNvSpPr txBox="1"/>
-          <p:nvPr/>
+          <p:cNvPr id="3" name="文本占位符 2">
+            <a:extLst>
+              <a:ext uri="{FF2B5EF4-FFF2-40B4-BE49-F238E27FC236}">
+                <a16:creationId xmlns:a16="http://schemas.microsoft.com/office/drawing/2014/main" id="{A8D577C4-FAD2-761A-9927-5222CF60B06F}"/>
+              </a:ext>
+            </a:extLst>
+          </p:cNvPr>
+          <p:cNvSpPr>
+            <a:spLocks noGrp="1"/>
+          </p:cNvSpPr>
+          <p:nvPr>
+            <p:ph type="body" idx="1"/>
+          </p:nvPr>
         </p:nvSpPr>
-        <p:spPr>
-          <a:xfrm>
-            <a:off x="3383280" y="2846758"/>
-            <a:ext cx="1268413" cy="954107"/>
-          </a:xfrm>
-          <a:prstGeom prst="rect">
-            <a:avLst/>
-          </a:prstGeom>
-          <a:noFill/>
-        </p:spPr>
+        <p:spPr/>
         <p:txBody>
-          <a:bodyPr wrap="square" rtlCol="0">
-            <a:spAutoFit/>
-          </a:bodyPr>
+          <a:bodyPr/>
           <a:lstStyle/>
           <a:p>
-            <a:pPr algn="dist"/>
-            <a:r>
-              <a:rPr lang="zh-CN" altLang="en-US" sz="3600" b="1" dirty="0"/>
-              <a:t>目 录</a:t>
-            </a:r>
-            <a:endParaRPr lang="en-US" altLang="zh-CN" sz="3600" b="1" dirty="0"/>
-          </a:p>
-          <a:p>
-            <a:pPr algn="dist"/>
-            <a:r>
-              <a:rPr lang="en" altLang="zh-CN" b="1" dirty="0"/>
-              <a:t>Contents</a:t>
-            </a:r>
-            <a:endParaRPr lang="zh-CN" altLang="en-US" b="1" dirty="0"/>
+            <a:endParaRPr lang="zh-CN" altLang="en-US" dirty="0"/>
           </a:p>
         </p:txBody>
       </p:sp>
     </p:spTree>
     <p:extLst>
       <p:ext uri="{BB962C8B-B14F-4D97-AF65-F5344CB8AC3E}">
-        <p14:creationId xmlns:p14="http://schemas.microsoft.com/office/powerpoint/2010/main" val="2789182882"/>
+        <p14:creationId xmlns:p14="http://schemas.microsoft.com/office/powerpoint/2010/main" val="143744834"/>
       </p:ext>
     </p:extLst>
   </p:cSld>
@@ -4560,7 +3563,13 @@
   <p:cSld>
     <p:spTree>
       <p:nvGrpSpPr>
-        <p:cNvPr id="1" name=""/>
+        <p:cNvPr id="1" name="">
+          <a:extLst>
+            <a:ext uri="{FF2B5EF4-FFF2-40B4-BE49-F238E27FC236}">
+              <a16:creationId xmlns:a16="http://schemas.microsoft.com/office/drawing/2014/main" id="{BCF99722-C47D-DE6C-F9D9-B74D001266EB}"/>
+            </a:ext>
+          </a:extLst>
+        </p:cNvPr>
         <p:cNvGrpSpPr/>
         <p:nvPr/>
       </p:nvGrpSpPr>
@@ -4577,7 +3586,7 @@
           <p:cNvPr id="2" name="标题 1">
             <a:extLst>
               <a:ext uri="{FF2B5EF4-FFF2-40B4-BE49-F238E27FC236}">
-                <a16:creationId xmlns:a16="http://schemas.microsoft.com/office/drawing/2014/main" id="{849E96E3-F409-E008-B877-7B11495ADA9B}"/>
+                <a16:creationId xmlns:a16="http://schemas.microsoft.com/office/drawing/2014/main" id="{EA420F8E-E946-3913-548E-0F5DE1B9CC4B}"/>
               </a:ext>
             </a:extLst>
           </p:cNvPr>
@@ -4585,24 +3594,32 @@
             <a:spLocks noGrp="1"/>
           </p:cNvSpPr>
           <p:nvPr>
-            <p:ph type="title"/>
+            <p:ph type="ctrTitle"/>
           </p:nvPr>
         </p:nvSpPr>
-        <p:spPr/>
+        <p:spPr>
+          <a:xfrm>
+            <a:off x="1888434" y="2564296"/>
+            <a:ext cx="7951305" cy="920503"/>
+          </a:xfrm>
+        </p:spPr>
         <p:txBody>
-          <a:bodyPr/>
+          <a:bodyPr>
+            <a:normAutofit fontScale="90000"/>
+          </a:bodyPr>
           <a:lstStyle/>
           <a:p>
+            <a:pPr algn="l"/>
             <a:endParaRPr lang="zh-CN" altLang="en-US" dirty="0"/>
           </a:p>
         </p:txBody>
       </p:sp>
       <p:sp>
         <p:nvSpPr>
-          <p:cNvPr id="3" name="文本占位符 2">
-            <a:extLst>
-              <a:ext uri="{FF2B5EF4-FFF2-40B4-BE49-F238E27FC236}">
-                <a16:creationId xmlns:a16="http://schemas.microsoft.com/office/drawing/2014/main" id="{A8D577C4-FAD2-761A-9927-5222CF60B06F}"/>
+          <p:cNvPr id="3" name="副标题 2">
+            <a:extLst>
+              <a:ext uri="{FF2B5EF4-FFF2-40B4-BE49-F238E27FC236}">
+                <a16:creationId xmlns:a16="http://schemas.microsoft.com/office/drawing/2014/main" id="{BB755FEA-5ABC-A8B5-7699-E471845C4FE2}"/>
               </a:ext>
             </a:extLst>
           </p:cNvPr>
@@ -4610,14 +3627,20 @@
             <a:spLocks noGrp="1"/>
           </p:cNvSpPr>
           <p:nvPr>
-            <p:ph type="body" idx="1"/>
+            <p:ph type="subTitle" idx="1"/>
           </p:nvPr>
         </p:nvSpPr>
-        <p:spPr/>
+        <p:spPr>
+          <a:xfrm>
+            <a:off x="1888434" y="3560400"/>
+            <a:ext cx="7951305" cy="693548"/>
+          </a:xfrm>
+        </p:spPr>
         <p:txBody>
           <a:bodyPr/>
           <a:lstStyle/>
           <a:p>
+            <a:pPr algn="l"/>
             <a:endParaRPr lang="zh-CN" altLang="en-US" dirty="0"/>
           </a:p>
         </p:txBody>
@@ -4625,7 +3648,7 @@
     </p:spTree>
     <p:extLst>
       <p:ext uri="{BB962C8B-B14F-4D97-AF65-F5344CB8AC3E}">
-        <p14:creationId xmlns:p14="http://schemas.microsoft.com/office/powerpoint/2010/main" val="143744834"/>
+        <p14:creationId xmlns:p14="http://schemas.microsoft.com/office/powerpoint/2010/main" val="332357733"/>
       </p:ext>
     </p:extLst>
   </p:cSld>
@@ -4654,10 +3677,10 @@
       </p:grpSpPr>
       <p:sp>
         <p:nvSpPr>
-          <p:cNvPr id="2" name="标题 1">
-            <a:extLst>
-              <a:ext uri="{FF2B5EF4-FFF2-40B4-BE49-F238E27FC236}">
-                <a16:creationId xmlns:a16="http://schemas.microsoft.com/office/drawing/2014/main" id="{AD14B309-2402-214B-2692-1CBBE48F8645}"/>
+          <p:cNvPr id="2" name="文本占位符 1">
+            <a:extLst>
+              <a:ext uri="{FF2B5EF4-FFF2-40B4-BE49-F238E27FC236}">
+                <a16:creationId xmlns:a16="http://schemas.microsoft.com/office/drawing/2014/main" id="{E4981B45-EBBA-D07E-CC08-7ACF16CBC7A0}"/>
               </a:ext>
             </a:extLst>
           </p:cNvPr>
@@ -4665,57 +3688,70 @@
             <a:spLocks noGrp="1"/>
           </p:cNvSpPr>
           <p:nvPr>
-            <p:ph type="title"/>
+            <p:ph type="body" sz="quarter" idx="10"/>
           </p:nvPr>
         </p:nvSpPr>
-        <p:spPr>
-          <a:xfrm>
-            <a:off x="608400" y="288360"/>
-            <a:ext cx="10969200" cy="705600"/>
-          </a:xfrm>
-        </p:spPr>
+        <p:spPr/>
         <p:txBody>
           <a:bodyPr/>
           <a:lstStyle/>
           <a:p>
-            <a:endParaRPr lang="zh-CN" altLang="en-US" dirty="0"/>
+            <a:pPr>
+              <a:buSzPct val="120000"/>
+            </a:pPr>
+            <a:endParaRPr lang="en-US" altLang="zh-CN" dirty="0"/>
           </a:p>
         </p:txBody>
       </p:sp>
       <p:sp>
         <p:nvSpPr>
-          <p:cNvPr id="3" name="内容占位符 2">
-            <a:extLst>
-              <a:ext uri="{FF2B5EF4-FFF2-40B4-BE49-F238E27FC236}">
-                <a16:creationId xmlns:a16="http://schemas.microsoft.com/office/drawing/2014/main" id="{407090AE-F050-7D6C-0C19-B16B155E2CF5}"/>
-              </a:ext>
-            </a:extLst>
-          </p:cNvPr>
-          <p:cNvSpPr>
-            <a:spLocks noGrp="1"/>
-          </p:cNvSpPr>
-          <p:nvPr>
-            <p:ph idx="1"/>
-          </p:nvPr>
+          <p:cNvPr id="3" name="文本框 2">
+            <a:extLst>
+              <a:ext uri="{FF2B5EF4-FFF2-40B4-BE49-F238E27FC236}">
+                <a16:creationId xmlns:a16="http://schemas.microsoft.com/office/drawing/2014/main" id="{F71EF3D0-261D-963A-851A-604F0FBF2F91}"/>
+              </a:ext>
+            </a:extLst>
+          </p:cNvPr>
+          <p:cNvSpPr txBox="1"/>
+          <p:nvPr/>
         </p:nvSpPr>
         <p:spPr>
           <a:xfrm>
-            <a:off x="608400" y="1204650"/>
-            <a:ext cx="10969200" cy="4759200"/>
-          </a:xfrm>
+            <a:off x="3383280" y="2846758"/>
+            <a:ext cx="1268413" cy="954107"/>
+          </a:xfrm>
+          <a:prstGeom prst="rect">
+            <a:avLst/>
+          </a:prstGeom>
+          <a:noFill/>
         </p:spPr>
         <p:txBody>
-          <a:bodyPr/>
+          <a:bodyPr wrap="square" rtlCol="0">
+            <a:spAutoFit/>
+          </a:bodyPr>
           <a:lstStyle/>
           <a:p>
-            <a:endParaRPr lang="zh-CN" altLang="en-US"/>
+            <a:pPr algn="dist"/>
+            <a:r>
+              <a:rPr lang="zh-CN" altLang="en-US" sz="3600" b="1" dirty="0"/>
+              <a:t>目 录</a:t>
+            </a:r>
+            <a:endParaRPr lang="en-US" altLang="zh-CN" sz="3600" b="1" dirty="0"/>
+          </a:p>
+          <a:p>
+            <a:pPr algn="dist"/>
+            <a:r>
+              <a:rPr lang="en" altLang="zh-CN" b="1" dirty="0"/>
+              <a:t>Contents</a:t>
+            </a:r>
+            <a:endParaRPr lang="zh-CN" altLang="en-US" b="1" dirty="0"/>
           </a:p>
         </p:txBody>
       </p:sp>
     </p:spTree>
     <p:extLst>
       <p:ext uri="{BB962C8B-B14F-4D97-AF65-F5344CB8AC3E}">
-        <p14:creationId xmlns:p14="http://schemas.microsoft.com/office/powerpoint/2010/main" val="676413615"/>
+        <p14:creationId xmlns:p14="http://schemas.microsoft.com/office/powerpoint/2010/main" val="2789182882"/>
       </p:ext>
     </p:extLst>
   </p:cSld>
@@ -4744,130 +3780,10 @@
       </p:grpSpPr>
       <p:sp>
         <p:nvSpPr>
-          <p:cNvPr id="3" name="文本占位符 2">
-            <a:extLst>
-              <a:ext uri="{FF2B5EF4-FFF2-40B4-BE49-F238E27FC236}">
-                <a16:creationId xmlns:a16="http://schemas.microsoft.com/office/drawing/2014/main" id="{871A5A54-A85B-13F8-734F-2987722BD350}"/>
-              </a:ext>
-            </a:extLst>
-          </p:cNvPr>
-          <p:cNvSpPr>
-            <a:spLocks noGrp="1"/>
-          </p:cNvSpPr>
-          <p:nvPr>
-            <p:ph type="body" idx="1"/>
-          </p:nvPr>
-        </p:nvSpPr>
-        <p:spPr>
-          <a:xfrm>
-            <a:off x="608400" y="1303470"/>
-            <a:ext cx="5342400" cy="381600"/>
-          </a:xfrm>
-        </p:spPr>
-        <p:txBody>
-          <a:bodyPr/>
-          <a:lstStyle/>
-          <a:p>
-            <a:endParaRPr lang="zh-CN" altLang="en-US"/>
-          </a:p>
-        </p:txBody>
-      </p:sp>
-      <p:sp>
-        <p:nvSpPr>
-          <p:cNvPr id="4" name="内容占位符 3">
-            <a:extLst>
-              <a:ext uri="{FF2B5EF4-FFF2-40B4-BE49-F238E27FC236}">
-                <a16:creationId xmlns:a16="http://schemas.microsoft.com/office/drawing/2014/main" id="{73AC7690-934F-2834-69E3-DDF6A0B4942E}"/>
-              </a:ext>
-            </a:extLst>
-          </p:cNvPr>
-          <p:cNvSpPr>
-            <a:spLocks noGrp="1"/>
-          </p:cNvSpPr>
-          <p:nvPr>
-            <p:ph sz="half" idx="2"/>
-          </p:nvPr>
-        </p:nvSpPr>
-        <p:spPr>
-          <a:xfrm>
-            <a:off x="608400" y="1728270"/>
-            <a:ext cx="5342400" cy="4053024"/>
-          </a:xfrm>
-        </p:spPr>
-        <p:txBody>
-          <a:bodyPr/>
-          <a:lstStyle/>
-          <a:p>
-            <a:endParaRPr lang="zh-CN" altLang="en-US"/>
-          </a:p>
-        </p:txBody>
-      </p:sp>
-      <p:sp>
-        <p:nvSpPr>
-          <p:cNvPr id="5" name="文本占位符 4">
-            <a:extLst>
-              <a:ext uri="{FF2B5EF4-FFF2-40B4-BE49-F238E27FC236}">
-                <a16:creationId xmlns:a16="http://schemas.microsoft.com/office/drawing/2014/main" id="{42CB7E04-F3A6-54E0-79D4-72BB4C977BC1}"/>
-              </a:ext>
-            </a:extLst>
-          </p:cNvPr>
-          <p:cNvSpPr>
-            <a:spLocks noGrp="1"/>
-          </p:cNvSpPr>
-          <p:nvPr>
-            <p:ph type="body" sz="quarter" idx="3"/>
-          </p:nvPr>
-        </p:nvSpPr>
-        <p:spPr>
-          <a:xfrm>
-            <a:off x="6235750" y="1295999"/>
-            <a:ext cx="5342400" cy="381600"/>
-          </a:xfrm>
-        </p:spPr>
-        <p:txBody>
-          <a:bodyPr/>
-          <a:lstStyle/>
-          <a:p>
-            <a:endParaRPr lang="zh-CN" altLang="en-US"/>
-          </a:p>
-        </p:txBody>
-      </p:sp>
-      <p:sp>
-        <p:nvSpPr>
-          <p:cNvPr id="6" name="内容占位符 5">
-            <a:extLst>
-              <a:ext uri="{FF2B5EF4-FFF2-40B4-BE49-F238E27FC236}">
-                <a16:creationId xmlns:a16="http://schemas.microsoft.com/office/drawing/2014/main" id="{3DD4584C-A3A8-03B0-4D60-BCC385F13EDC}"/>
-              </a:ext>
-            </a:extLst>
-          </p:cNvPr>
-          <p:cNvSpPr>
-            <a:spLocks noGrp="1"/>
-          </p:cNvSpPr>
-          <p:nvPr>
-            <p:ph sz="quarter" idx="4"/>
-          </p:nvPr>
-        </p:nvSpPr>
-        <p:spPr>
-          <a:xfrm>
-            <a:off x="6235750" y="1728270"/>
-            <a:ext cx="5342400" cy="4053024"/>
-          </a:xfrm>
-        </p:spPr>
-        <p:txBody>
-          <a:bodyPr/>
-          <a:lstStyle/>
-          <a:p>
-            <a:endParaRPr lang="zh-CN" altLang="en-US"/>
-          </a:p>
-        </p:txBody>
-      </p:sp>
-      <p:sp>
-        <p:nvSpPr>
-          <p:cNvPr id="7" name="标题 1">
-            <a:extLst>
-              <a:ext uri="{FF2B5EF4-FFF2-40B4-BE49-F238E27FC236}">
-                <a16:creationId xmlns:a16="http://schemas.microsoft.com/office/drawing/2014/main" id="{31C2D54B-EA7C-B248-835E-9738DD1FD9E1}"/>
+          <p:cNvPr id="2" name="标题 1">
+            <a:extLst>
+              <a:ext uri="{FF2B5EF4-FFF2-40B4-BE49-F238E27FC236}">
+                <a16:creationId xmlns:a16="http://schemas.microsoft.com/office/drawing/2014/main" id="{AD14B309-2402-214B-2692-1CBBE48F8645}"/>
               </a:ext>
             </a:extLst>
           </p:cNvPr>
@@ -4892,10 +3808,40 @@
           </a:p>
         </p:txBody>
       </p:sp>
+      <p:sp>
+        <p:nvSpPr>
+          <p:cNvPr id="3" name="内容占位符 2">
+            <a:extLst>
+              <a:ext uri="{FF2B5EF4-FFF2-40B4-BE49-F238E27FC236}">
+                <a16:creationId xmlns:a16="http://schemas.microsoft.com/office/drawing/2014/main" id="{407090AE-F050-7D6C-0C19-B16B155E2CF5}"/>
+              </a:ext>
+            </a:extLst>
+          </p:cNvPr>
+          <p:cNvSpPr>
+            <a:spLocks noGrp="1"/>
+          </p:cNvSpPr>
+          <p:nvPr>
+            <p:ph idx="1"/>
+          </p:nvPr>
+        </p:nvSpPr>
+        <p:spPr>
+          <a:xfrm>
+            <a:off x="608400" y="1204650"/>
+            <a:ext cx="10969200" cy="4759200"/>
+          </a:xfrm>
+        </p:spPr>
+        <p:txBody>
+          <a:bodyPr/>
+          <a:lstStyle/>
+          <a:p>
+            <a:endParaRPr lang="zh-CN" altLang="en-US"/>
+          </a:p>
+        </p:txBody>
+      </p:sp>
     </p:spTree>
     <p:extLst>
       <p:ext uri="{BB962C8B-B14F-4D97-AF65-F5344CB8AC3E}">
-        <p14:creationId xmlns:p14="http://schemas.microsoft.com/office/powerpoint/2010/main" val="4072393099"/>
+        <p14:creationId xmlns:p14="http://schemas.microsoft.com/office/powerpoint/2010/main" val="676413615"/>
       </p:ext>
     </p:extLst>
   </p:cSld>
@@ -4924,6 +3870,186 @@
       </p:grpSpPr>
       <p:sp>
         <p:nvSpPr>
+          <p:cNvPr id="3" name="文本占位符 2">
+            <a:extLst>
+              <a:ext uri="{FF2B5EF4-FFF2-40B4-BE49-F238E27FC236}">
+                <a16:creationId xmlns:a16="http://schemas.microsoft.com/office/drawing/2014/main" id="{871A5A54-A85B-13F8-734F-2987722BD350}"/>
+              </a:ext>
+            </a:extLst>
+          </p:cNvPr>
+          <p:cNvSpPr>
+            <a:spLocks noGrp="1"/>
+          </p:cNvSpPr>
+          <p:nvPr>
+            <p:ph type="body" idx="1"/>
+          </p:nvPr>
+        </p:nvSpPr>
+        <p:spPr>
+          <a:xfrm>
+            <a:off x="608400" y="1303470"/>
+            <a:ext cx="5342400" cy="381600"/>
+          </a:xfrm>
+        </p:spPr>
+        <p:txBody>
+          <a:bodyPr/>
+          <a:lstStyle/>
+          <a:p>
+            <a:endParaRPr lang="zh-CN" altLang="en-US" dirty="0"/>
+          </a:p>
+        </p:txBody>
+      </p:sp>
+      <p:sp>
+        <p:nvSpPr>
+          <p:cNvPr id="4" name="内容占位符 3">
+            <a:extLst>
+              <a:ext uri="{FF2B5EF4-FFF2-40B4-BE49-F238E27FC236}">
+                <a16:creationId xmlns:a16="http://schemas.microsoft.com/office/drawing/2014/main" id="{73AC7690-934F-2834-69E3-DDF6A0B4942E}"/>
+              </a:ext>
+            </a:extLst>
+          </p:cNvPr>
+          <p:cNvSpPr>
+            <a:spLocks noGrp="1"/>
+          </p:cNvSpPr>
+          <p:nvPr>
+            <p:ph sz="half" idx="2"/>
+          </p:nvPr>
+        </p:nvSpPr>
+        <p:spPr>
+          <a:xfrm>
+            <a:off x="608400" y="1728270"/>
+            <a:ext cx="5342400" cy="4053024"/>
+          </a:xfrm>
+        </p:spPr>
+        <p:txBody>
+          <a:bodyPr/>
+          <a:lstStyle/>
+          <a:p>
+            <a:endParaRPr lang="zh-CN" altLang="en-US" dirty="0"/>
+          </a:p>
+        </p:txBody>
+      </p:sp>
+      <p:sp>
+        <p:nvSpPr>
+          <p:cNvPr id="5" name="文本占位符 4">
+            <a:extLst>
+              <a:ext uri="{FF2B5EF4-FFF2-40B4-BE49-F238E27FC236}">
+                <a16:creationId xmlns:a16="http://schemas.microsoft.com/office/drawing/2014/main" id="{42CB7E04-F3A6-54E0-79D4-72BB4C977BC1}"/>
+              </a:ext>
+            </a:extLst>
+          </p:cNvPr>
+          <p:cNvSpPr>
+            <a:spLocks noGrp="1"/>
+          </p:cNvSpPr>
+          <p:nvPr>
+            <p:ph type="body" sz="quarter" idx="3"/>
+          </p:nvPr>
+        </p:nvSpPr>
+        <p:spPr>
+          <a:xfrm>
+            <a:off x="6235750" y="1295999"/>
+            <a:ext cx="5342400" cy="381600"/>
+          </a:xfrm>
+        </p:spPr>
+        <p:txBody>
+          <a:bodyPr/>
+          <a:lstStyle/>
+          <a:p>
+            <a:endParaRPr lang="zh-CN" altLang="en-US"/>
+          </a:p>
+        </p:txBody>
+      </p:sp>
+      <p:sp>
+        <p:nvSpPr>
+          <p:cNvPr id="6" name="内容占位符 5">
+            <a:extLst>
+              <a:ext uri="{FF2B5EF4-FFF2-40B4-BE49-F238E27FC236}">
+                <a16:creationId xmlns:a16="http://schemas.microsoft.com/office/drawing/2014/main" id="{3DD4584C-A3A8-03B0-4D60-BCC385F13EDC}"/>
+              </a:ext>
+            </a:extLst>
+          </p:cNvPr>
+          <p:cNvSpPr>
+            <a:spLocks noGrp="1"/>
+          </p:cNvSpPr>
+          <p:nvPr>
+            <p:ph sz="quarter" idx="4"/>
+          </p:nvPr>
+        </p:nvSpPr>
+        <p:spPr>
+          <a:xfrm>
+            <a:off x="6235750" y="1728270"/>
+            <a:ext cx="5342400" cy="4053024"/>
+          </a:xfrm>
+        </p:spPr>
+        <p:txBody>
+          <a:bodyPr/>
+          <a:lstStyle/>
+          <a:p>
+            <a:endParaRPr lang="zh-CN" altLang="en-US"/>
+          </a:p>
+        </p:txBody>
+      </p:sp>
+      <p:sp>
+        <p:nvSpPr>
+          <p:cNvPr id="7" name="标题 1">
+            <a:extLst>
+              <a:ext uri="{FF2B5EF4-FFF2-40B4-BE49-F238E27FC236}">
+                <a16:creationId xmlns:a16="http://schemas.microsoft.com/office/drawing/2014/main" id="{31C2D54B-EA7C-B248-835E-9738DD1FD9E1}"/>
+              </a:ext>
+            </a:extLst>
+          </p:cNvPr>
+          <p:cNvSpPr>
+            <a:spLocks noGrp="1"/>
+          </p:cNvSpPr>
+          <p:nvPr>
+            <p:ph type="title"/>
+          </p:nvPr>
+        </p:nvSpPr>
+        <p:spPr>
+          <a:xfrm>
+            <a:off x="608400" y="288360"/>
+            <a:ext cx="10969200" cy="705600"/>
+          </a:xfrm>
+        </p:spPr>
+        <p:txBody>
+          <a:bodyPr/>
+          <a:lstStyle/>
+          <a:p>
+            <a:endParaRPr lang="zh-CN" altLang="en-US" dirty="0"/>
+          </a:p>
+        </p:txBody>
+      </p:sp>
+    </p:spTree>
+    <p:extLst>
+      <p:ext uri="{BB962C8B-B14F-4D97-AF65-F5344CB8AC3E}">
+        <p14:creationId xmlns:p14="http://schemas.microsoft.com/office/powerpoint/2010/main" val="4072393099"/>
+      </p:ext>
+    </p:extLst>
+  </p:cSld>
+  <p:clrMapOvr>
+    <a:masterClrMapping/>
+  </p:clrMapOvr>
+</p:sld>
+</file>
+
+<file path=ppt/slides/slide7.xml><?xml version="1.0" encoding="utf-8"?>
+<p:sld xmlns:a="http://schemas.openxmlformats.org/drawingml/2006/main" xmlns:r="http://schemas.openxmlformats.org/officeDocument/2006/relationships" xmlns:p="http://schemas.openxmlformats.org/presentationml/2006/main">
+  <p:cSld>
+    <p:spTree>
+      <p:nvGrpSpPr>
+        <p:cNvPr id="1" name=""/>
+        <p:cNvGrpSpPr/>
+        <p:nvPr/>
+      </p:nvGrpSpPr>
+      <p:grpSpPr>
+        <a:xfrm>
+          <a:off x="0" y="0"/>
+          <a:ext cx="0" cy="0"/>
+          <a:chOff x="0" y="0"/>
+          <a:chExt cx="0" cy="0"/>
+        </a:xfrm>
+      </p:grpSpPr>
+      <p:sp>
+        <p:nvSpPr>
           <p:cNvPr id="3" name="标题 1">
             <a:extLst>
               <a:ext uri="{FF2B5EF4-FFF2-40B4-BE49-F238E27FC236}">
@@ -4965,7 +4091,7 @@
 </p:sld>
 </file>
 
-<file path=ppt/slides/slide7.xml><?xml version="1.0" encoding="utf-8"?>
+<file path=ppt/slides/slide8.xml><?xml version="1.0" encoding="utf-8"?>
 <p:sld xmlns:a="http://schemas.openxmlformats.org/drawingml/2006/main" xmlns:r="http://schemas.openxmlformats.org/officeDocument/2006/relationships" xmlns:p="http://schemas.openxmlformats.org/presentationml/2006/main">
   <p:cSld>
     <p:spTree>
@@ -4995,7 +4121,7 @@
 </p:sld>
 </file>
 
-<file path=ppt/slides/slide8.xml><?xml version="1.0" encoding="utf-8"?>
+<file path=ppt/slides/slide9.xml><?xml version="1.0" encoding="utf-8"?>
 <p:sld xmlns:a="http://schemas.openxmlformats.org/drawingml/2006/main" xmlns:r="http://schemas.openxmlformats.org/officeDocument/2006/relationships" xmlns:p="http://schemas.openxmlformats.org/presentationml/2006/main">
   <p:cSld>
     <p:spTree>
@@ -5067,7 +4193,7 @@
   <p:tag name="KSO_WM_UNIT_COMPATIBLE" val="0"/>
   <p:tag name="KSO_WM_UNIT_DIAGRAM_ISNUMVISUAL" val="0"/>
   <p:tag name="KSO_WM_UNIT_DIAGRAM_ISREFERUNIT" val="0"/>
-  <p:tag name="KSO_WM_UNIT_ID" val="_2**"/>
+  <p:tag name="KSO_WM_UNIT_ID" val="_3**"/>
   <p:tag name="KSO_WM_UNIT_LAYERLEVEL" val="1"/>
   <p:tag name="KSO_WM_TAG_VERSION" val="1.0"/>
   <p:tag name="KSO_WM_BEAUTIFY_FLAG" val="#wm#"/>
@@ -5080,7 +4206,7 @@
   <p:tag name="KSO_WM_UNIT_COMPATIBLE" val="0"/>
   <p:tag name="KSO_WM_UNIT_DIAGRAM_ISNUMVISUAL" val="0"/>
   <p:tag name="KSO_WM_UNIT_DIAGRAM_ISREFERUNIT" val="0"/>
-  <p:tag name="KSO_WM_UNIT_ID" val="_2**"/>
+  <p:tag name="KSO_WM_UNIT_ID" val="_3**"/>
   <p:tag name="KSO_WM_UNIT_LAYERLEVEL" val="1"/>
   <p:tag name="KSO_WM_TAG_VERSION" val="1.0"/>
   <p:tag name="KSO_WM_BEAUTIFY_FLAG" val="#wm#"/>
@@ -5106,7 +4232,7 @@
   <p:tag name="KSO_WM_UNIT_COMPATIBLE" val="0"/>
   <p:tag name="KSO_WM_UNIT_DIAGRAM_ISNUMVISUAL" val="0"/>
   <p:tag name="KSO_WM_UNIT_DIAGRAM_ISREFERUNIT" val="0"/>
-  <p:tag name="KSO_WM_UNIT_ID" val="_3**"/>
+  <p:tag name="KSO_WM_UNIT_ID" val="_5**"/>
   <p:tag name="KSO_WM_UNIT_LAYERLEVEL" val="1"/>
   <p:tag name="KSO_WM_TAG_VERSION" val="1.0"/>
   <p:tag name="KSO_WM_BEAUTIFY_FLAG" val="#wm#"/>
@@ -5119,7 +4245,7 @@
   <p:tag name="KSO_WM_UNIT_COMPATIBLE" val="0"/>
   <p:tag name="KSO_WM_UNIT_DIAGRAM_ISNUMVISUAL" val="0"/>
   <p:tag name="KSO_WM_UNIT_DIAGRAM_ISREFERUNIT" val="0"/>
-  <p:tag name="KSO_WM_UNIT_ID" val="_3**"/>
+  <p:tag name="KSO_WM_UNIT_ID" val="_5**"/>
   <p:tag name="KSO_WM_UNIT_LAYERLEVEL" val="1"/>
   <p:tag name="KSO_WM_TAG_VERSION" val="1.0"/>
   <p:tag name="KSO_WM_BEAUTIFY_FLAG" val="#wm#"/>
@@ -5158,7 +4284,7 @@
   <p:tag name="KSO_WM_UNIT_COMPATIBLE" val="0"/>
   <p:tag name="KSO_WM_UNIT_DIAGRAM_ISNUMVISUAL" val="0"/>
   <p:tag name="KSO_WM_UNIT_DIAGRAM_ISREFERUNIT" val="0"/>
-  <p:tag name="KSO_WM_UNIT_ID" val="_5**"/>
+  <p:tag name="KSO_WM_UNIT_ID" val="_4**"/>
   <p:tag name="KSO_WM_UNIT_LAYERLEVEL" val="1"/>
   <p:tag name="KSO_WM_TAG_VERSION" val="1.0"/>
   <p:tag name="KSO_WM_BEAUTIFY_FLAG" val="#wm#"/>
@@ -5171,7 +4297,7 @@
   <p:tag name="KSO_WM_UNIT_COMPATIBLE" val="0"/>
   <p:tag name="KSO_WM_UNIT_DIAGRAM_ISNUMVISUAL" val="0"/>
   <p:tag name="KSO_WM_UNIT_DIAGRAM_ISREFERUNIT" val="0"/>
-  <p:tag name="KSO_WM_UNIT_ID" val="_5**"/>
+  <p:tag name="KSO_WM_UNIT_ID" val="_4**"/>
   <p:tag name="KSO_WM_UNIT_LAYERLEVEL" val="1"/>
   <p:tag name="KSO_WM_TAG_VERSION" val="1.0"/>
   <p:tag name="KSO_WM_BEAUTIFY_FLAG" val="#wm#"/>
@@ -5184,7 +4310,7 @@
   <p:tag name="KSO_WM_UNIT_COMPATIBLE" val="0"/>
   <p:tag name="KSO_WM_UNIT_DIAGRAM_ISNUMVISUAL" val="0"/>
   <p:tag name="KSO_WM_UNIT_DIAGRAM_ISREFERUNIT" val="0"/>
-  <p:tag name="KSO_WM_UNIT_ID" val="_5**"/>
+  <p:tag name="KSO_WM_UNIT_ID" val="_8**"/>
   <p:tag name="KSO_WM_UNIT_LAYERLEVEL" val="1"/>
   <p:tag name="KSO_WM_TAG_VERSION" val="1.0"/>
   <p:tag name="KSO_WM_BEAUTIFY_FLAG" val="#wm#"/>
@@ -5211,7 +4337,7 @@
   <p:tag name="KSO_WM_UNIT_COMPATIBLE" val="0"/>
   <p:tag name="KSO_WM_UNIT_DIAGRAM_ISNUMVISUAL" val="0"/>
   <p:tag name="KSO_WM_UNIT_DIAGRAM_ISREFERUNIT" val="0"/>
-  <p:tag name="KSO_WM_UNIT_ID" val="_5**"/>
+  <p:tag name="KSO_WM_UNIT_ID" val="_8**"/>
   <p:tag name="KSO_WM_UNIT_LAYERLEVEL" val="1"/>
   <p:tag name="KSO_WM_TAG_VERSION" val="1.0"/>
   <p:tag name="KSO_WM_BEAUTIFY_FLAG" val="#wm#"/>
@@ -5224,7 +4350,7 @@
   <p:tag name="KSO_WM_UNIT_COMPATIBLE" val="0"/>
   <p:tag name="KSO_WM_UNIT_DIAGRAM_ISNUMVISUAL" val="0"/>
   <p:tag name="KSO_WM_UNIT_DIAGRAM_ISREFERUNIT" val="0"/>
-  <p:tag name="KSO_WM_UNIT_ID" val="_5**"/>
+  <p:tag name="KSO_WM_UNIT_ID" val="_10**"/>
   <p:tag name="KSO_WM_UNIT_LAYERLEVEL" val="1"/>
   <p:tag name="KSO_WM_TAG_VERSION" val="1.0"/>
   <p:tag name="KSO_WM_BEAUTIFY_FLAG" val="#wm#"/>
@@ -5237,7 +4363,7 @@
   <p:tag name="KSO_WM_UNIT_COMPATIBLE" val="0"/>
   <p:tag name="KSO_WM_UNIT_DIAGRAM_ISNUMVISUAL" val="0"/>
   <p:tag name="KSO_WM_UNIT_DIAGRAM_ISREFERUNIT" val="0"/>
-  <p:tag name="KSO_WM_UNIT_ID" val="_5**"/>
+  <p:tag name="KSO_WM_UNIT_ID" val="_11**"/>
   <p:tag name="KSO_WM_UNIT_LAYERLEVEL" val="1"/>
   <p:tag name="KSO_WM_TAG_VERSION" val="1.0"/>
   <p:tag name="KSO_WM_BEAUTIFY_FLAG" val="#wm#"/>
@@ -5250,7 +4376,7 @@
   <p:tag name="KSO_WM_UNIT_COMPATIBLE" val="0"/>
   <p:tag name="KSO_WM_UNIT_DIAGRAM_ISNUMVISUAL" val="0"/>
   <p:tag name="KSO_WM_UNIT_DIAGRAM_ISREFERUNIT" val="0"/>
-  <p:tag name="KSO_WM_UNIT_ID" val="_5**"/>
+  <p:tag name="KSO_WM_UNIT_ID" val="_11**"/>
   <p:tag name="KSO_WM_UNIT_LAYERLEVEL" val="1"/>
   <p:tag name="KSO_WM_TAG_VERSION" val="1.0"/>
   <p:tag name="KSO_WM_BEAUTIFY_FLAG" val="#wm#"/>
@@ -5263,72 +4389,7 @@
   <p:tag name="KSO_WM_UNIT_COMPATIBLE" val="0"/>
   <p:tag name="KSO_WM_UNIT_DIAGRAM_ISNUMVISUAL" val="0"/>
   <p:tag name="KSO_WM_UNIT_DIAGRAM_ISREFERUNIT" val="0"/>
-  <p:tag name="KSO_WM_UNIT_ID" val="_4**"/>
-  <p:tag name="KSO_WM_UNIT_LAYERLEVEL" val="1"/>
-  <p:tag name="KSO_WM_TAG_VERSION" val="1.0"/>
-  <p:tag name="KSO_WM_BEAUTIFY_FLAG" val="#wm#"/>
-</p:tagLst>
-</file>
-
-<file path=ppt/tags/tag25.xml><?xml version="1.0" encoding="utf-8"?>
-<p:tagLst xmlns:a="http://schemas.openxmlformats.org/drawingml/2006/main" xmlns:r="http://schemas.openxmlformats.org/officeDocument/2006/relationships" xmlns:p="http://schemas.openxmlformats.org/presentationml/2006/main">
-  <p:tag name="KSO_WM_UNIT_HIGHLIGHT" val="0"/>
-  <p:tag name="KSO_WM_UNIT_COMPATIBLE" val="0"/>
-  <p:tag name="KSO_WM_UNIT_DIAGRAM_ISNUMVISUAL" val="0"/>
-  <p:tag name="KSO_WM_UNIT_DIAGRAM_ISREFERUNIT" val="0"/>
-  <p:tag name="KSO_WM_UNIT_ID" val="_4**"/>
-  <p:tag name="KSO_WM_UNIT_LAYERLEVEL" val="1"/>
-  <p:tag name="KSO_WM_TAG_VERSION" val="1.0"/>
-  <p:tag name="KSO_WM_BEAUTIFY_FLAG" val="#wm#"/>
-</p:tagLst>
-</file>
-
-<file path=ppt/tags/tag26.xml><?xml version="1.0" encoding="utf-8"?>
-<p:tagLst xmlns:a="http://schemas.openxmlformats.org/drawingml/2006/main" xmlns:r="http://schemas.openxmlformats.org/officeDocument/2006/relationships" xmlns:p="http://schemas.openxmlformats.org/presentationml/2006/main">
-  <p:tag name="KSO_WM_UNIT_HIGHLIGHT" val="0"/>
-  <p:tag name="KSO_WM_UNIT_COMPATIBLE" val="0"/>
-  <p:tag name="KSO_WM_UNIT_DIAGRAM_ISNUMVISUAL" val="0"/>
-  <p:tag name="KSO_WM_UNIT_DIAGRAM_ISREFERUNIT" val="0"/>
-  <p:tag name="KSO_WM_UNIT_ID" val="_4**"/>
-  <p:tag name="KSO_WM_UNIT_LAYERLEVEL" val="1"/>
-  <p:tag name="KSO_WM_TAG_VERSION" val="1.0"/>
-  <p:tag name="KSO_WM_BEAUTIFY_FLAG" val="#wm#"/>
-</p:tagLst>
-</file>
-
-<file path=ppt/tags/tag27.xml><?xml version="1.0" encoding="utf-8"?>
-<p:tagLst xmlns:a="http://schemas.openxmlformats.org/drawingml/2006/main" xmlns:r="http://schemas.openxmlformats.org/officeDocument/2006/relationships" xmlns:p="http://schemas.openxmlformats.org/presentationml/2006/main">
-  <p:tag name="KSO_WM_UNIT_HIGHLIGHT" val="0"/>
-  <p:tag name="KSO_WM_UNIT_COMPATIBLE" val="0"/>
-  <p:tag name="KSO_WM_UNIT_DIAGRAM_ISNUMVISUAL" val="0"/>
-  <p:tag name="KSO_WM_UNIT_DIAGRAM_ISREFERUNIT" val="0"/>
-  <p:tag name="KSO_WM_UNIT_ID" val="_4**"/>
-  <p:tag name="KSO_WM_UNIT_LAYERLEVEL" val="1"/>
-  <p:tag name="KSO_WM_TAG_VERSION" val="1.0"/>
-  <p:tag name="KSO_WM_BEAUTIFY_FLAG" val="#wm#"/>
-</p:tagLst>
-</file>
-
-<file path=ppt/tags/tag28.xml><?xml version="1.0" encoding="utf-8"?>
-<p:tagLst xmlns:a="http://schemas.openxmlformats.org/drawingml/2006/main" xmlns:r="http://schemas.openxmlformats.org/officeDocument/2006/relationships" xmlns:p="http://schemas.openxmlformats.org/presentationml/2006/main">
-  <p:tag name="KSO_WM_UNIT_HIGHLIGHT" val="0"/>
-  <p:tag name="KSO_WM_UNIT_COMPATIBLE" val="0"/>
-  <p:tag name="KSO_WM_UNIT_DIAGRAM_ISNUMVISUAL" val="0"/>
-  <p:tag name="KSO_WM_UNIT_DIAGRAM_ISREFERUNIT" val="0"/>
-  <p:tag name="KSO_WM_UNIT_ID" val="_4**"/>
-  <p:tag name="KSO_WM_UNIT_LAYERLEVEL" val="1"/>
-  <p:tag name="KSO_WM_TAG_VERSION" val="1.0"/>
-  <p:tag name="KSO_WM_BEAUTIFY_FLAG" val="#wm#"/>
-</p:tagLst>
-</file>
-
-<file path=ppt/tags/tag29.xml><?xml version="1.0" encoding="utf-8"?>
-<p:tagLst xmlns:a="http://schemas.openxmlformats.org/drawingml/2006/main" xmlns:r="http://schemas.openxmlformats.org/officeDocument/2006/relationships" xmlns:p="http://schemas.openxmlformats.org/presentationml/2006/main">
-  <p:tag name="KSO_WM_UNIT_HIGHLIGHT" val="0"/>
-  <p:tag name="KSO_WM_UNIT_COMPATIBLE" val="0"/>
-  <p:tag name="KSO_WM_UNIT_DIAGRAM_ISNUMVISUAL" val="0"/>
-  <p:tag name="KSO_WM_UNIT_DIAGRAM_ISREFERUNIT" val="0"/>
-  <p:tag name="KSO_WM_UNIT_ID" val="_8**"/>
+  <p:tag name="KSO_WM_UNIT_ID" val="_11**"/>
   <p:tag name="KSO_WM_UNIT_LAYERLEVEL" val="1"/>
   <p:tag name="KSO_WM_TAG_VERSION" val="1.0"/>
   <p:tag name="KSO_WM_BEAUTIFY_FLAG" val="#wm#"/>
@@ -5347,136 +4408,6 @@
   <p:tag name="KSO_WM_BEAUTIFY_FLAG" val="#wm#"/>
   <p:tag name="KSO_WM_TEMPLATE_CATEGORY" val="custom"/>
   <p:tag name="KSO_WM_TEMPLATE_INDEX" val="20205081"/>
-</p:tagLst>
-</file>
-
-<file path=ppt/tags/tag30.xml><?xml version="1.0" encoding="utf-8"?>
-<p:tagLst xmlns:a="http://schemas.openxmlformats.org/drawingml/2006/main" xmlns:r="http://schemas.openxmlformats.org/officeDocument/2006/relationships" xmlns:p="http://schemas.openxmlformats.org/presentationml/2006/main">
-  <p:tag name="KSO_WM_UNIT_HIGHLIGHT" val="0"/>
-  <p:tag name="KSO_WM_UNIT_COMPATIBLE" val="0"/>
-  <p:tag name="KSO_WM_UNIT_DIAGRAM_ISNUMVISUAL" val="0"/>
-  <p:tag name="KSO_WM_UNIT_DIAGRAM_ISREFERUNIT" val="0"/>
-  <p:tag name="KSO_WM_UNIT_ID" val="_8**"/>
-  <p:tag name="KSO_WM_UNIT_LAYERLEVEL" val="1"/>
-  <p:tag name="KSO_WM_TAG_VERSION" val="1.0"/>
-  <p:tag name="KSO_WM_BEAUTIFY_FLAG" val="#wm#"/>
-</p:tagLst>
-</file>
-
-<file path=ppt/tags/tag31.xml><?xml version="1.0" encoding="utf-8"?>
-<p:tagLst xmlns:a="http://schemas.openxmlformats.org/drawingml/2006/main" xmlns:r="http://schemas.openxmlformats.org/officeDocument/2006/relationships" xmlns:p="http://schemas.openxmlformats.org/presentationml/2006/main">
-  <p:tag name="KSO_WM_UNIT_HIGHLIGHT" val="0"/>
-  <p:tag name="KSO_WM_UNIT_COMPATIBLE" val="0"/>
-  <p:tag name="KSO_WM_UNIT_DIAGRAM_ISNUMVISUAL" val="0"/>
-  <p:tag name="KSO_WM_UNIT_DIAGRAM_ISREFERUNIT" val="0"/>
-  <p:tag name="KSO_WM_UNIT_ID" val="_8**"/>
-  <p:tag name="KSO_WM_UNIT_LAYERLEVEL" val="1"/>
-  <p:tag name="KSO_WM_TAG_VERSION" val="1.0"/>
-  <p:tag name="KSO_WM_BEAUTIFY_FLAG" val="#wm#"/>
-</p:tagLst>
-</file>
-
-<file path=ppt/tags/tag32.xml><?xml version="1.0" encoding="utf-8"?>
-<p:tagLst xmlns:a="http://schemas.openxmlformats.org/drawingml/2006/main" xmlns:r="http://schemas.openxmlformats.org/officeDocument/2006/relationships" xmlns:p="http://schemas.openxmlformats.org/presentationml/2006/main">
-  <p:tag name="KSO_WM_UNIT_HIGHLIGHT" val="0"/>
-  <p:tag name="KSO_WM_UNIT_COMPATIBLE" val="0"/>
-  <p:tag name="KSO_WM_UNIT_DIAGRAM_ISNUMVISUAL" val="0"/>
-  <p:tag name="KSO_WM_UNIT_DIAGRAM_ISREFERUNIT" val="0"/>
-  <p:tag name="KSO_WM_UNIT_ID" val="_8**"/>
-  <p:tag name="KSO_WM_UNIT_LAYERLEVEL" val="1"/>
-  <p:tag name="KSO_WM_TAG_VERSION" val="1.0"/>
-  <p:tag name="KSO_WM_BEAUTIFY_FLAG" val="#wm#"/>
-</p:tagLst>
-</file>
-
-<file path=ppt/tags/tag33.xml><?xml version="1.0" encoding="utf-8"?>
-<p:tagLst xmlns:a="http://schemas.openxmlformats.org/drawingml/2006/main" xmlns:r="http://schemas.openxmlformats.org/officeDocument/2006/relationships" xmlns:p="http://schemas.openxmlformats.org/presentationml/2006/main">
-  <p:tag name="KSO_WM_UNIT_HIGHLIGHT" val="0"/>
-  <p:tag name="KSO_WM_UNIT_COMPATIBLE" val="0"/>
-  <p:tag name="KSO_WM_UNIT_DIAGRAM_ISNUMVISUAL" val="0"/>
-  <p:tag name="KSO_WM_UNIT_DIAGRAM_ISREFERUNIT" val="0"/>
-  <p:tag name="KSO_WM_UNIT_ID" val="_8**"/>
-  <p:tag name="KSO_WM_UNIT_LAYERLEVEL" val="1"/>
-  <p:tag name="KSO_WM_TAG_VERSION" val="1.0"/>
-  <p:tag name="KSO_WM_BEAUTIFY_FLAG" val="#wm#"/>
-</p:tagLst>
-</file>
-
-<file path=ppt/tags/tag34.xml><?xml version="1.0" encoding="utf-8"?>
-<p:tagLst xmlns:a="http://schemas.openxmlformats.org/drawingml/2006/main" xmlns:r="http://schemas.openxmlformats.org/officeDocument/2006/relationships" xmlns:p="http://schemas.openxmlformats.org/presentationml/2006/main">
-  <p:tag name="KSO_WM_UNIT_HIGHLIGHT" val="0"/>
-  <p:tag name="KSO_WM_UNIT_COMPATIBLE" val="0"/>
-  <p:tag name="KSO_WM_UNIT_DIAGRAM_ISNUMVISUAL" val="0"/>
-  <p:tag name="KSO_WM_UNIT_DIAGRAM_ISREFERUNIT" val="0"/>
-  <p:tag name="KSO_WM_UNIT_ID" val="_6**"/>
-  <p:tag name="KSO_WM_UNIT_LAYERLEVEL" val="1"/>
-  <p:tag name="KSO_WM_TAG_VERSION" val="1.0"/>
-  <p:tag name="KSO_WM_BEAUTIFY_FLAG" val="#wm#"/>
-</p:tagLst>
-</file>
-
-<file path=ppt/tags/tag35.xml><?xml version="1.0" encoding="utf-8"?>
-<p:tagLst xmlns:a="http://schemas.openxmlformats.org/drawingml/2006/main" xmlns:r="http://schemas.openxmlformats.org/officeDocument/2006/relationships" xmlns:p="http://schemas.openxmlformats.org/presentationml/2006/main">
-  <p:tag name="KSO_WM_UNIT_HIGHLIGHT" val="0"/>
-  <p:tag name="KSO_WM_UNIT_COMPATIBLE" val="0"/>
-  <p:tag name="KSO_WM_UNIT_DIAGRAM_ISNUMVISUAL" val="0"/>
-  <p:tag name="KSO_WM_UNIT_DIAGRAM_ISREFERUNIT" val="0"/>
-  <p:tag name="KSO_WM_UNIT_ID" val="_10**"/>
-  <p:tag name="KSO_WM_UNIT_LAYERLEVEL" val="1"/>
-  <p:tag name="KSO_WM_TAG_VERSION" val="1.0"/>
-  <p:tag name="KSO_WM_BEAUTIFY_FLAG" val="#wm#"/>
-</p:tagLst>
-</file>
-
-<file path=ppt/tags/tag36.xml><?xml version="1.0" encoding="utf-8"?>
-<p:tagLst xmlns:a="http://schemas.openxmlformats.org/drawingml/2006/main" xmlns:r="http://schemas.openxmlformats.org/officeDocument/2006/relationships" xmlns:p="http://schemas.openxmlformats.org/presentationml/2006/main">
-  <p:tag name="KSO_WM_UNIT_HIGHLIGHT" val="0"/>
-  <p:tag name="KSO_WM_UNIT_COMPATIBLE" val="0"/>
-  <p:tag name="KSO_WM_UNIT_DIAGRAM_ISNUMVISUAL" val="0"/>
-  <p:tag name="KSO_WM_UNIT_DIAGRAM_ISREFERUNIT" val="0"/>
-  <p:tag name="KSO_WM_UNIT_ID" val="_10**"/>
-  <p:tag name="KSO_WM_UNIT_LAYERLEVEL" val="1"/>
-  <p:tag name="KSO_WM_TAG_VERSION" val="1.0"/>
-  <p:tag name="KSO_WM_BEAUTIFY_FLAG" val="#wm#"/>
-</p:tagLst>
-</file>
-
-<file path=ppt/tags/tag37.xml><?xml version="1.0" encoding="utf-8"?>
-<p:tagLst xmlns:a="http://schemas.openxmlformats.org/drawingml/2006/main" xmlns:r="http://schemas.openxmlformats.org/officeDocument/2006/relationships" xmlns:p="http://schemas.openxmlformats.org/presentationml/2006/main">
-  <p:tag name="KSO_WM_UNIT_HIGHLIGHT" val="0"/>
-  <p:tag name="KSO_WM_UNIT_COMPATIBLE" val="0"/>
-  <p:tag name="KSO_WM_UNIT_DIAGRAM_ISNUMVISUAL" val="0"/>
-  <p:tag name="KSO_WM_UNIT_DIAGRAM_ISREFERUNIT" val="0"/>
-  <p:tag name="KSO_WM_UNIT_ID" val="_11**"/>
-  <p:tag name="KSO_WM_UNIT_LAYERLEVEL" val="1"/>
-  <p:tag name="KSO_WM_TAG_VERSION" val="1.0"/>
-  <p:tag name="KSO_WM_BEAUTIFY_FLAG" val="#wm#"/>
-</p:tagLst>
-</file>
-
-<file path=ppt/tags/tag38.xml><?xml version="1.0" encoding="utf-8"?>
-<p:tagLst xmlns:a="http://schemas.openxmlformats.org/drawingml/2006/main" xmlns:r="http://schemas.openxmlformats.org/officeDocument/2006/relationships" xmlns:p="http://schemas.openxmlformats.org/presentationml/2006/main">
-  <p:tag name="KSO_WM_UNIT_HIGHLIGHT" val="0"/>
-  <p:tag name="KSO_WM_UNIT_COMPATIBLE" val="0"/>
-  <p:tag name="KSO_WM_UNIT_DIAGRAM_ISNUMVISUAL" val="0"/>
-  <p:tag name="KSO_WM_UNIT_DIAGRAM_ISREFERUNIT" val="0"/>
-  <p:tag name="KSO_WM_UNIT_ID" val="_11**"/>
-  <p:tag name="KSO_WM_UNIT_LAYERLEVEL" val="1"/>
-  <p:tag name="KSO_WM_TAG_VERSION" val="1.0"/>
-  <p:tag name="KSO_WM_BEAUTIFY_FLAG" val="#wm#"/>
-</p:tagLst>
-</file>
-
-<file path=ppt/tags/tag39.xml><?xml version="1.0" encoding="utf-8"?>
-<p:tagLst xmlns:a="http://schemas.openxmlformats.org/drawingml/2006/main" xmlns:r="http://schemas.openxmlformats.org/officeDocument/2006/relationships" xmlns:p="http://schemas.openxmlformats.org/presentationml/2006/main">
-  <p:tag name="KSO_WM_UNIT_HIGHLIGHT" val="0"/>
-  <p:tag name="KSO_WM_UNIT_COMPATIBLE" val="0"/>
-  <p:tag name="KSO_WM_UNIT_DIAGRAM_ISNUMVISUAL" val="0"/>
-  <p:tag name="KSO_WM_UNIT_DIAGRAM_ISREFERUNIT" val="0"/>
-  <p:tag name="KSO_WM_UNIT_ID" val="_11**"/>
-  <p:tag name="KSO_WM_UNIT_LAYERLEVEL" val="1"/>
-  <p:tag name="KSO_WM_TAG_VERSION" val="1.0"/>
-  <p:tag name="KSO_WM_BEAUTIFY_FLAG" val="#wm#"/>
 </p:tagLst>
 </file>
 

</xml_diff>